<commit_message>
preparing for lecture 1.2
</commit_message>
<xml_diff>
--- a/lectures/1.1Welcome/lecture.pptx
+++ b/lectures/1.1Welcome/lecture.pptx
@@ -15,8 +15,6 @@
     <p:sldId id="270" r:id="rId9"/>
     <p:sldId id="272" r:id="rId10"/>
     <p:sldId id="265" r:id="rId11"/>
-    <p:sldId id="268" r:id="rId12"/>
-    <p:sldId id="271" r:id="rId13"/>
   </p:sldIdLst>
   <p:sldSz cx="12192000" cy="6858000"/>
   <p:notesSz cx="6858000" cy="9144000"/>
@@ -123,3666 +121,6 @@
 </p:presentation>
 </file>
 
-<file path=ppt/diagrams/colors1.xml><?xml version="1.0" encoding="utf-8"?>
-<dgm:colorsDef xmlns:dgm="http://schemas.openxmlformats.org/drawingml/2006/diagram" xmlns:a="http://schemas.openxmlformats.org/drawingml/2006/main" uniqueId="urn:microsoft.com/office/officeart/2005/8/colors/accent1_2">
-  <dgm:title val=""/>
-  <dgm:desc val=""/>
-  <dgm:catLst>
-    <dgm:cat type="accent1" pri="11200"/>
-  </dgm:catLst>
-  <dgm:styleLbl name="node0">
-    <dgm:fillClrLst meth="repeat">
-      <a:schemeClr val="accent1"/>
-    </dgm:fillClrLst>
-    <dgm:linClrLst meth="repeat">
-      <a:schemeClr val="lt1"/>
-    </dgm:linClrLst>
-    <dgm:effectClrLst/>
-    <dgm:txLinClrLst/>
-    <dgm:txFillClrLst/>
-    <dgm:txEffectClrLst/>
-  </dgm:styleLbl>
-  <dgm:styleLbl name="alignNode1">
-    <dgm:fillClrLst meth="repeat">
-      <a:schemeClr val="accent1"/>
-    </dgm:fillClrLst>
-    <dgm:linClrLst meth="repeat">
-      <a:schemeClr val="accent1"/>
-    </dgm:linClrLst>
-    <dgm:effectClrLst/>
-    <dgm:txLinClrLst/>
-    <dgm:txFillClrLst/>
-    <dgm:txEffectClrLst/>
-  </dgm:styleLbl>
-  <dgm:styleLbl name="node1">
-    <dgm:fillClrLst meth="repeat">
-      <a:schemeClr val="accent1"/>
-    </dgm:fillClrLst>
-    <dgm:linClrLst meth="repeat">
-      <a:schemeClr val="lt1"/>
-    </dgm:linClrLst>
-    <dgm:effectClrLst/>
-    <dgm:txLinClrLst/>
-    <dgm:txFillClrLst/>
-    <dgm:txEffectClrLst/>
-  </dgm:styleLbl>
-  <dgm:styleLbl name="lnNode1">
-    <dgm:fillClrLst meth="repeat">
-      <a:schemeClr val="accent1"/>
-    </dgm:fillClrLst>
-    <dgm:linClrLst meth="repeat">
-      <a:schemeClr val="lt1"/>
-    </dgm:linClrLst>
-    <dgm:effectClrLst/>
-    <dgm:txLinClrLst/>
-    <dgm:txFillClrLst/>
-    <dgm:txEffectClrLst/>
-  </dgm:styleLbl>
-  <dgm:styleLbl name="vennNode1">
-    <dgm:fillClrLst meth="repeat">
-      <a:schemeClr val="accent1">
-        <a:alpha val="50000"/>
-      </a:schemeClr>
-    </dgm:fillClrLst>
-    <dgm:linClrLst meth="repeat">
-      <a:schemeClr val="lt1"/>
-    </dgm:linClrLst>
-    <dgm:effectClrLst/>
-    <dgm:txLinClrLst/>
-    <dgm:txFillClrLst/>
-    <dgm:txEffectClrLst/>
-  </dgm:styleLbl>
-  <dgm:styleLbl name="node2">
-    <dgm:fillClrLst meth="repeat">
-      <a:schemeClr val="accent1"/>
-    </dgm:fillClrLst>
-    <dgm:linClrLst meth="repeat">
-      <a:schemeClr val="lt1"/>
-    </dgm:linClrLst>
-    <dgm:effectClrLst/>
-    <dgm:txLinClrLst/>
-    <dgm:txFillClrLst/>
-    <dgm:txEffectClrLst/>
-  </dgm:styleLbl>
-  <dgm:styleLbl name="node3">
-    <dgm:fillClrLst meth="repeat">
-      <a:schemeClr val="accent1"/>
-    </dgm:fillClrLst>
-    <dgm:linClrLst meth="repeat">
-      <a:schemeClr val="lt1"/>
-    </dgm:linClrLst>
-    <dgm:effectClrLst/>
-    <dgm:txLinClrLst/>
-    <dgm:txFillClrLst/>
-    <dgm:txEffectClrLst/>
-  </dgm:styleLbl>
-  <dgm:styleLbl name="node4">
-    <dgm:fillClrLst meth="repeat">
-      <a:schemeClr val="accent1"/>
-    </dgm:fillClrLst>
-    <dgm:linClrLst meth="repeat">
-      <a:schemeClr val="lt1"/>
-    </dgm:linClrLst>
-    <dgm:effectClrLst/>
-    <dgm:txLinClrLst/>
-    <dgm:txFillClrLst/>
-    <dgm:txEffectClrLst/>
-  </dgm:styleLbl>
-  <dgm:styleLbl name="fgImgPlace1">
-    <dgm:fillClrLst meth="repeat">
-      <a:schemeClr val="accent1">
-        <a:tint val="50000"/>
-      </a:schemeClr>
-    </dgm:fillClrLst>
-    <dgm:linClrLst meth="repeat">
-      <a:schemeClr val="lt1"/>
-    </dgm:linClrLst>
-    <dgm:effectClrLst/>
-    <dgm:txLinClrLst/>
-    <dgm:txFillClrLst meth="repeat">
-      <a:schemeClr val="lt1"/>
-    </dgm:txFillClrLst>
-    <dgm:txEffectClrLst/>
-  </dgm:styleLbl>
-  <dgm:styleLbl name="alignImgPlace1">
-    <dgm:fillClrLst meth="repeat">
-      <a:schemeClr val="accent1">
-        <a:tint val="50000"/>
-      </a:schemeClr>
-    </dgm:fillClrLst>
-    <dgm:linClrLst meth="repeat">
-      <a:schemeClr val="lt1"/>
-    </dgm:linClrLst>
-    <dgm:effectClrLst/>
-    <dgm:txLinClrLst/>
-    <dgm:txFillClrLst meth="repeat">
-      <a:schemeClr val="lt1"/>
-    </dgm:txFillClrLst>
-    <dgm:txEffectClrLst/>
-  </dgm:styleLbl>
-  <dgm:styleLbl name="bgImgPlace1">
-    <dgm:fillClrLst meth="repeat">
-      <a:schemeClr val="accent1">
-        <a:tint val="50000"/>
-      </a:schemeClr>
-    </dgm:fillClrLst>
-    <dgm:linClrLst meth="repeat">
-      <a:schemeClr val="lt1"/>
-    </dgm:linClrLst>
-    <dgm:effectClrLst/>
-    <dgm:txLinClrLst/>
-    <dgm:txFillClrLst meth="repeat">
-      <a:schemeClr val="lt1"/>
-    </dgm:txFillClrLst>
-    <dgm:txEffectClrLst/>
-  </dgm:styleLbl>
-  <dgm:styleLbl name="sibTrans2D1">
-    <dgm:fillClrLst meth="repeat">
-      <a:schemeClr val="accent1">
-        <a:tint val="60000"/>
-      </a:schemeClr>
-    </dgm:fillClrLst>
-    <dgm:linClrLst meth="repeat">
-      <a:schemeClr val="accent1">
-        <a:tint val="60000"/>
-      </a:schemeClr>
-    </dgm:linClrLst>
-    <dgm:effectClrLst/>
-    <dgm:txLinClrLst/>
-    <dgm:txFillClrLst/>
-    <dgm:txEffectClrLst/>
-  </dgm:styleLbl>
-  <dgm:styleLbl name="fgSibTrans2D1">
-    <dgm:fillClrLst meth="repeat">
-      <a:schemeClr val="accent1">
-        <a:tint val="60000"/>
-      </a:schemeClr>
-    </dgm:fillClrLst>
-    <dgm:linClrLst meth="repeat">
-      <a:schemeClr val="accent1">
-        <a:tint val="60000"/>
-      </a:schemeClr>
-    </dgm:linClrLst>
-    <dgm:effectClrLst/>
-    <dgm:txLinClrLst/>
-    <dgm:txFillClrLst/>
-    <dgm:txEffectClrLst/>
-  </dgm:styleLbl>
-  <dgm:styleLbl name="bgSibTrans2D1">
-    <dgm:fillClrLst meth="repeat">
-      <a:schemeClr val="accent1">
-        <a:tint val="60000"/>
-      </a:schemeClr>
-    </dgm:fillClrLst>
-    <dgm:linClrLst meth="repeat">
-      <a:schemeClr val="accent1">
-        <a:tint val="60000"/>
-      </a:schemeClr>
-    </dgm:linClrLst>
-    <dgm:effectClrLst/>
-    <dgm:txLinClrLst/>
-    <dgm:txFillClrLst/>
-    <dgm:txEffectClrLst/>
-  </dgm:styleLbl>
-  <dgm:styleLbl name="sibTrans1D1">
-    <dgm:fillClrLst meth="repeat">
-      <a:schemeClr val="accent1"/>
-    </dgm:fillClrLst>
-    <dgm:linClrLst meth="repeat">
-      <a:schemeClr val="accent1"/>
-    </dgm:linClrLst>
-    <dgm:effectClrLst/>
-    <dgm:txLinClrLst/>
-    <dgm:txFillClrLst meth="repeat">
-      <a:schemeClr val="tx1"/>
-    </dgm:txFillClrLst>
-    <dgm:txEffectClrLst/>
-  </dgm:styleLbl>
-  <dgm:styleLbl name="callout">
-    <dgm:fillClrLst meth="repeat">
-      <a:schemeClr val="accent1"/>
-    </dgm:fillClrLst>
-    <dgm:linClrLst meth="repeat">
-      <a:schemeClr val="accent1">
-        <a:tint val="50000"/>
-      </a:schemeClr>
-    </dgm:linClrLst>
-    <dgm:effectClrLst/>
-    <dgm:txLinClrLst/>
-    <dgm:txFillClrLst meth="repeat">
-      <a:schemeClr val="tx1"/>
-    </dgm:txFillClrLst>
-    <dgm:txEffectClrLst/>
-  </dgm:styleLbl>
-  <dgm:styleLbl name="asst0">
-    <dgm:fillClrLst meth="repeat">
-      <a:schemeClr val="accent1"/>
-    </dgm:fillClrLst>
-    <dgm:linClrLst meth="repeat">
-      <a:schemeClr val="lt1"/>
-    </dgm:linClrLst>
-    <dgm:effectClrLst/>
-    <dgm:txLinClrLst/>
-    <dgm:txFillClrLst/>
-    <dgm:txEffectClrLst/>
-  </dgm:styleLbl>
-  <dgm:styleLbl name="asst1">
-    <dgm:fillClrLst meth="repeat">
-      <a:schemeClr val="accent1"/>
-    </dgm:fillClrLst>
-    <dgm:linClrLst meth="repeat">
-      <a:schemeClr val="lt1"/>
-    </dgm:linClrLst>
-    <dgm:effectClrLst/>
-    <dgm:txLinClrLst/>
-    <dgm:txFillClrLst/>
-    <dgm:txEffectClrLst/>
-  </dgm:styleLbl>
-  <dgm:styleLbl name="asst2">
-    <dgm:fillClrLst meth="repeat">
-      <a:schemeClr val="accent1"/>
-    </dgm:fillClrLst>
-    <dgm:linClrLst meth="repeat">
-      <a:schemeClr val="lt1"/>
-    </dgm:linClrLst>
-    <dgm:effectClrLst/>
-    <dgm:txLinClrLst/>
-    <dgm:txFillClrLst/>
-    <dgm:txEffectClrLst/>
-  </dgm:styleLbl>
-  <dgm:styleLbl name="asst3">
-    <dgm:fillClrLst meth="repeat">
-      <a:schemeClr val="accent1"/>
-    </dgm:fillClrLst>
-    <dgm:linClrLst meth="repeat">
-      <a:schemeClr val="lt1"/>
-    </dgm:linClrLst>
-    <dgm:effectClrLst/>
-    <dgm:txLinClrLst/>
-    <dgm:txFillClrLst/>
-    <dgm:txEffectClrLst/>
-  </dgm:styleLbl>
-  <dgm:styleLbl name="asst4">
-    <dgm:fillClrLst meth="repeat">
-      <a:schemeClr val="accent1"/>
-    </dgm:fillClrLst>
-    <dgm:linClrLst meth="repeat">
-      <a:schemeClr val="lt1"/>
-    </dgm:linClrLst>
-    <dgm:effectClrLst/>
-    <dgm:txLinClrLst/>
-    <dgm:txFillClrLst/>
-    <dgm:txEffectClrLst/>
-  </dgm:styleLbl>
-  <dgm:styleLbl name="parChTrans2D1">
-    <dgm:fillClrLst meth="repeat">
-      <a:schemeClr val="accent1">
-        <a:tint val="60000"/>
-      </a:schemeClr>
-    </dgm:fillClrLst>
-    <dgm:linClrLst meth="repeat">
-      <a:schemeClr val="accent1">
-        <a:tint val="60000"/>
-      </a:schemeClr>
-    </dgm:linClrLst>
-    <dgm:effectClrLst/>
-    <dgm:txLinClrLst/>
-    <dgm:txFillClrLst meth="repeat">
-      <a:schemeClr val="lt1"/>
-    </dgm:txFillClrLst>
-    <dgm:txEffectClrLst/>
-  </dgm:styleLbl>
-  <dgm:styleLbl name="parChTrans2D2">
-    <dgm:fillClrLst meth="repeat">
-      <a:schemeClr val="accent1"/>
-    </dgm:fillClrLst>
-    <dgm:linClrLst meth="repeat">
-      <a:schemeClr val="accent1"/>
-    </dgm:linClrLst>
-    <dgm:effectClrLst/>
-    <dgm:txLinClrLst/>
-    <dgm:txFillClrLst meth="repeat">
-      <a:schemeClr val="lt1"/>
-    </dgm:txFillClrLst>
-    <dgm:txEffectClrLst/>
-  </dgm:styleLbl>
-  <dgm:styleLbl name="parChTrans2D3">
-    <dgm:fillClrLst meth="repeat">
-      <a:schemeClr val="accent1"/>
-    </dgm:fillClrLst>
-    <dgm:linClrLst meth="repeat">
-      <a:schemeClr val="accent1"/>
-    </dgm:linClrLst>
-    <dgm:effectClrLst/>
-    <dgm:txLinClrLst/>
-    <dgm:txFillClrLst meth="repeat">
-      <a:schemeClr val="lt1"/>
-    </dgm:txFillClrLst>
-    <dgm:txEffectClrLst/>
-  </dgm:styleLbl>
-  <dgm:styleLbl name="parChTrans2D4">
-    <dgm:fillClrLst meth="repeat">
-      <a:schemeClr val="accent1"/>
-    </dgm:fillClrLst>
-    <dgm:linClrLst meth="repeat">
-      <a:schemeClr val="accent1"/>
-    </dgm:linClrLst>
-    <dgm:effectClrLst/>
-    <dgm:txLinClrLst/>
-    <dgm:txFillClrLst meth="repeat">
-      <a:schemeClr val="lt1"/>
-    </dgm:txFillClrLst>
-    <dgm:txEffectClrLst/>
-  </dgm:styleLbl>
-  <dgm:styleLbl name="parChTrans1D1">
-    <dgm:fillClrLst meth="repeat">
-      <a:schemeClr val="accent1"/>
-    </dgm:fillClrLst>
-    <dgm:linClrLst meth="repeat">
-      <a:schemeClr val="accent1">
-        <a:shade val="60000"/>
-      </a:schemeClr>
-    </dgm:linClrLst>
-    <dgm:effectClrLst/>
-    <dgm:txLinClrLst/>
-    <dgm:txFillClrLst meth="repeat">
-      <a:schemeClr val="tx1"/>
-    </dgm:txFillClrLst>
-    <dgm:txEffectClrLst/>
-  </dgm:styleLbl>
-  <dgm:styleLbl name="parChTrans1D2">
-    <dgm:fillClrLst meth="repeat">
-      <a:schemeClr val="accent1"/>
-    </dgm:fillClrLst>
-    <dgm:linClrLst meth="repeat">
-      <a:schemeClr val="accent1">
-        <a:shade val="60000"/>
-      </a:schemeClr>
-    </dgm:linClrLst>
-    <dgm:effectClrLst/>
-    <dgm:txLinClrLst/>
-    <dgm:txFillClrLst meth="repeat">
-      <a:schemeClr val="tx1"/>
-    </dgm:txFillClrLst>
-    <dgm:txEffectClrLst/>
-  </dgm:styleLbl>
-  <dgm:styleLbl name="parChTrans1D3">
-    <dgm:fillClrLst meth="repeat">
-      <a:schemeClr val="accent1"/>
-    </dgm:fillClrLst>
-    <dgm:linClrLst meth="repeat">
-      <a:schemeClr val="accent1">
-        <a:shade val="80000"/>
-      </a:schemeClr>
-    </dgm:linClrLst>
-    <dgm:effectClrLst/>
-    <dgm:txLinClrLst/>
-    <dgm:txFillClrLst meth="repeat">
-      <a:schemeClr val="tx1"/>
-    </dgm:txFillClrLst>
-    <dgm:txEffectClrLst/>
-  </dgm:styleLbl>
-  <dgm:styleLbl name="parChTrans1D4">
-    <dgm:fillClrLst meth="repeat">
-      <a:schemeClr val="accent1"/>
-    </dgm:fillClrLst>
-    <dgm:linClrLst meth="repeat">
-      <a:schemeClr val="accent1">
-        <a:shade val="80000"/>
-      </a:schemeClr>
-    </dgm:linClrLst>
-    <dgm:effectClrLst/>
-    <dgm:txLinClrLst/>
-    <dgm:txFillClrLst meth="repeat">
-      <a:schemeClr val="tx1"/>
-    </dgm:txFillClrLst>
-    <dgm:txEffectClrLst/>
-  </dgm:styleLbl>
-  <dgm:styleLbl name="fgAcc1">
-    <dgm:fillClrLst meth="repeat">
-      <a:schemeClr val="lt1">
-        <a:alpha val="90000"/>
-      </a:schemeClr>
-    </dgm:fillClrLst>
-    <dgm:linClrLst meth="repeat">
-      <a:schemeClr val="accent1"/>
-    </dgm:linClrLst>
-    <dgm:effectClrLst/>
-    <dgm:txLinClrLst/>
-    <dgm:txFillClrLst meth="repeat">
-      <a:schemeClr val="dk1"/>
-    </dgm:txFillClrLst>
-    <dgm:txEffectClrLst/>
-  </dgm:styleLbl>
-  <dgm:styleLbl name="conFgAcc1">
-    <dgm:fillClrLst meth="repeat">
-      <a:schemeClr val="lt1">
-        <a:alpha val="90000"/>
-      </a:schemeClr>
-    </dgm:fillClrLst>
-    <dgm:linClrLst meth="repeat">
-      <a:schemeClr val="accent1"/>
-    </dgm:linClrLst>
-    <dgm:effectClrLst/>
-    <dgm:txLinClrLst/>
-    <dgm:txFillClrLst meth="repeat">
-      <a:schemeClr val="dk1"/>
-    </dgm:txFillClrLst>
-    <dgm:txEffectClrLst/>
-  </dgm:styleLbl>
-  <dgm:styleLbl name="alignAcc1">
-    <dgm:fillClrLst meth="repeat">
-      <a:schemeClr val="lt1">
-        <a:alpha val="90000"/>
-      </a:schemeClr>
-    </dgm:fillClrLst>
-    <dgm:linClrLst meth="repeat">
-      <a:schemeClr val="accent1"/>
-    </dgm:linClrLst>
-    <dgm:effectClrLst/>
-    <dgm:txLinClrLst/>
-    <dgm:txFillClrLst meth="repeat">
-      <a:schemeClr val="dk1"/>
-    </dgm:txFillClrLst>
-    <dgm:txEffectClrLst/>
-  </dgm:styleLbl>
-  <dgm:styleLbl name="trAlignAcc1">
-    <dgm:fillClrLst meth="repeat">
-      <a:schemeClr val="lt1">
-        <a:alpha val="40000"/>
-      </a:schemeClr>
-    </dgm:fillClrLst>
-    <dgm:linClrLst meth="repeat">
-      <a:schemeClr val="accent1"/>
-    </dgm:linClrLst>
-    <dgm:effectClrLst/>
-    <dgm:txLinClrLst/>
-    <dgm:txFillClrLst meth="repeat">
-      <a:schemeClr val="dk1"/>
-    </dgm:txFillClrLst>
-    <dgm:txEffectClrLst/>
-  </dgm:styleLbl>
-  <dgm:styleLbl name="bgAcc1">
-    <dgm:fillClrLst meth="repeat">
-      <a:schemeClr val="lt1">
-        <a:alpha val="90000"/>
-      </a:schemeClr>
-    </dgm:fillClrLst>
-    <dgm:linClrLst meth="repeat">
-      <a:schemeClr val="accent1"/>
-    </dgm:linClrLst>
-    <dgm:effectClrLst/>
-    <dgm:txLinClrLst/>
-    <dgm:txFillClrLst meth="repeat">
-      <a:schemeClr val="dk1"/>
-    </dgm:txFillClrLst>
-    <dgm:txEffectClrLst/>
-  </dgm:styleLbl>
-  <dgm:styleLbl name="solidFgAcc1">
-    <dgm:fillClrLst meth="repeat">
-      <a:schemeClr val="lt1"/>
-    </dgm:fillClrLst>
-    <dgm:linClrLst meth="repeat">
-      <a:schemeClr val="accent1"/>
-    </dgm:linClrLst>
-    <dgm:effectClrLst/>
-    <dgm:txLinClrLst/>
-    <dgm:txFillClrLst meth="repeat">
-      <a:schemeClr val="dk1"/>
-    </dgm:txFillClrLst>
-    <dgm:txEffectClrLst/>
-  </dgm:styleLbl>
-  <dgm:styleLbl name="solidAlignAcc1">
-    <dgm:fillClrLst meth="repeat">
-      <a:schemeClr val="lt1"/>
-    </dgm:fillClrLst>
-    <dgm:linClrLst meth="repeat">
-      <a:schemeClr val="accent1"/>
-    </dgm:linClrLst>
-    <dgm:effectClrLst/>
-    <dgm:txLinClrLst/>
-    <dgm:txFillClrLst meth="repeat">
-      <a:schemeClr val="dk1"/>
-    </dgm:txFillClrLst>
-    <dgm:txEffectClrLst/>
-  </dgm:styleLbl>
-  <dgm:styleLbl name="solidBgAcc1">
-    <dgm:fillClrLst meth="repeat">
-      <a:schemeClr val="lt1"/>
-    </dgm:fillClrLst>
-    <dgm:linClrLst meth="repeat">
-      <a:schemeClr val="accent1"/>
-    </dgm:linClrLst>
-    <dgm:effectClrLst/>
-    <dgm:txLinClrLst/>
-    <dgm:txFillClrLst meth="repeat">
-      <a:schemeClr val="dk1"/>
-    </dgm:txFillClrLst>
-    <dgm:txEffectClrLst/>
-  </dgm:styleLbl>
-  <dgm:styleLbl name="fgAccFollowNode1">
-    <dgm:fillClrLst meth="repeat">
-      <a:schemeClr val="accent1">
-        <a:alpha val="90000"/>
-        <a:tint val="40000"/>
-      </a:schemeClr>
-    </dgm:fillClrLst>
-    <dgm:linClrLst meth="repeat">
-      <a:schemeClr val="accent1">
-        <a:alpha val="90000"/>
-        <a:tint val="40000"/>
-      </a:schemeClr>
-    </dgm:linClrLst>
-    <dgm:effectClrLst/>
-    <dgm:txLinClrLst/>
-    <dgm:txFillClrLst meth="repeat">
-      <a:schemeClr val="dk1"/>
-    </dgm:txFillClrLst>
-    <dgm:txEffectClrLst/>
-  </dgm:styleLbl>
-  <dgm:styleLbl name="alignAccFollowNode1">
-    <dgm:fillClrLst meth="repeat">
-      <a:schemeClr val="accent1">
-        <a:alpha val="90000"/>
-        <a:tint val="40000"/>
-      </a:schemeClr>
-    </dgm:fillClrLst>
-    <dgm:linClrLst meth="repeat">
-      <a:schemeClr val="accent1">
-        <a:alpha val="90000"/>
-        <a:tint val="40000"/>
-      </a:schemeClr>
-    </dgm:linClrLst>
-    <dgm:effectClrLst/>
-    <dgm:txLinClrLst/>
-    <dgm:txFillClrLst meth="repeat">
-      <a:schemeClr val="dk1"/>
-    </dgm:txFillClrLst>
-    <dgm:txEffectClrLst/>
-  </dgm:styleLbl>
-  <dgm:styleLbl name="bgAccFollowNode1">
-    <dgm:fillClrLst meth="repeat">
-      <a:schemeClr val="accent1">
-        <a:alpha val="90000"/>
-        <a:tint val="40000"/>
-      </a:schemeClr>
-    </dgm:fillClrLst>
-    <dgm:linClrLst meth="repeat">
-      <a:schemeClr val="accent1">
-        <a:alpha val="90000"/>
-        <a:tint val="40000"/>
-      </a:schemeClr>
-    </dgm:linClrLst>
-    <dgm:effectClrLst/>
-    <dgm:txLinClrLst/>
-    <dgm:txFillClrLst meth="repeat">
-      <a:schemeClr val="dk1"/>
-    </dgm:txFillClrLst>
-    <dgm:txEffectClrLst/>
-  </dgm:styleLbl>
-  <dgm:styleLbl name="fgAcc0">
-    <dgm:fillClrLst meth="repeat">
-      <a:schemeClr val="lt1">
-        <a:alpha val="90000"/>
-      </a:schemeClr>
-    </dgm:fillClrLst>
-    <dgm:linClrLst meth="repeat">
-      <a:schemeClr val="accent1"/>
-    </dgm:linClrLst>
-    <dgm:effectClrLst/>
-    <dgm:txLinClrLst/>
-    <dgm:txFillClrLst meth="repeat">
-      <a:schemeClr val="dk1"/>
-    </dgm:txFillClrLst>
-    <dgm:txEffectClrLst/>
-  </dgm:styleLbl>
-  <dgm:styleLbl name="fgAcc2">
-    <dgm:fillClrLst meth="repeat">
-      <a:schemeClr val="lt1">
-        <a:alpha val="90000"/>
-      </a:schemeClr>
-    </dgm:fillClrLst>
-    <dgm:linClrLst meth="repeat">
-      <a:schemeClr val="accent1"/>
-    </dgm:linClrLst>
-    <dgm:effectClrLst/>
-    <dgm:txLinClrLst/>
-    <dgm:txFillClrLst meth="repeat">
-      <a:schemeClr val="dk1"/>
-    </dgm:txFillClrLst>
-    <dgm:txEffectClrLst/>
-  </dgm:styleLbl>
-  <dgm:styleLbl name="fgAcc3">
-    <dgm:fillClrLst meth="repeat">
-      <a:schemeClr val="lt1">
-        <a:alpha val="90000"/>
-      </a:schemeClr>
-    </dgm:fillClrLst>
-    <dgm:linClrLst meth="repeat">
-      <a:schemeClr val="accent1"/>
-    </dgm:linClrLst>
-    <dgm:effectClrLst/>
-    <dgm:txLinClrLst/>
-    <dgm:txFillClrLst meth="repeat">
-      <a:schemeClr val="dk1"/>
-    </dgm:txFillClrLst>
-    <dgm:txEffectClrLst/>
-  </dgm:styleLbl>
-  <dgm:styleLbl name="fgAcc4">
-    <dgm:fillClrLst meth="repeat">
-      <a:schemeClr val="lt1">
-        <a:alpha val="90000"/>
-      </a:schemeClr>
-    </dgm:fillClrLst>
-    <dgm:linClrLst meth="repeat">
-      <a:schemeClr val="accent1"/>
-    </dgm:linClrLst>
-    <dgm:effectClrLst/>
-    <dgm:txLinClrLst/>
-    <dgm:txFillClrLst meth="repeat">
-      <a:schemeClr val="dk1"/>
-    </dgm:txFillClrLst>
-    <dgm:txEffectClrLst/>
-  </dgm:styleLbl>
-  <dgm:styleLbl name="bgShp">
-    <dgm:fillClrLst meth="repeat">
-      <a:schemeClr val="accent1">
-        <a:tint val="40000"/>
-      </a:schemeClr>
-    </dgm:fillClrLst>
-    <dgm:linClrLst meth="repeat">
-      <a:schemeClr val="accent1"/>
-    </dgm:linClrLst>
-    <dgm:effectClrLst/>
-    <dgm:txLinClrLst/>
-    <dgm:txFillClrLst meth="repeat">
-      <a:schemeClr val="dk1"/>
-    </dgm:txFillClrLst>
-    <dgm:txEffectClrLst/>
-  </dgm:styleLbl>
-  <dgm:styleLbl name="dkBgShp">
-    <dgm:fillClrLst meth="repeat">
-      <a:schemeClr val="accent1">
-        <a:shade val="80000"/>
-      </a:schemeClr>
-    </dgm:fillClrLst>
-    <dgm:linClrLst meth="repeat">
-      <a:schemeClr val="accent1"/>
-    </dgm:linClrLst>
-    <dgm:effectClrLst/>
-    <dgm:txLinClrLst/>
-    <dgm:txFillClrLst meth="repeat">
-      <a:schemeClr val="lt1"/>
-    </dgm:txFillClrLst>
-    <dgm:txEffectClrLst/>
-  </dgm:styleLbl>
-  <dgm:styleLbl name="trBgShp">
-    <dgm:fillClrLst meth="repeat">
-      <a:schemeClr val="accent1">
-        <a:tint val="50000"/>
-        <a:alpha val="40000"/>
-      </a:schemeClr>
-    </dgm:fillClrLst>
-    <dgm:linClrLst meth="repeat">
-      <a:schemeClr val="accent1"/>
-    </dgm:linClrLst>
-    <dgm:effectClrLst/>
-    <dgm:txLinClrLst/>
-    <dgm:txFillClrLst meth="repeat">
-      <a:schemeClr val="lt1"/>
-    </dgm:txFillClrLst>
-    <dgm:txEffectClrLst/>
-  </dgm:styleLbl>
-  <dgm:styleLbl name="fgShp">
-    <dgm:fillClrLst meth="repeat">
-      <a:schemeClr val="accent1">
-        <a:tint val="60000"/>
-      </a:schemeClr>
-    </dgm:fillClrLst>
-    <dgm:linClrLst meth="repeat">
-      <a:schemeClr val="lt1"/>
-    </dgm:linClrLst>
-    <dgm:effectClrLst/>
-    <dgm:txLinClrLst/>
-    <dgm:txFillClrLst meth="repeat">
-      <a:schemeClr val="dk1"/>
-    </dgm:txFillClrLst>
-    <dgm:txEffectClrLst/>
-  </dgm:styleLbl>
-  <dgm:styleLbl name="revTx">
-    <dgm:fillClrLst meth="repeat">
-      <a:schemeClr val="lt1">
-        <a:alpha val="0"/>
-      </a:schemeClr>
-    </dgm:fillClrLst>
-    <dgm:linClrLst meth="repeat">
-      <a:schemeClr val="dk1">
-        <a:alpha val="0"/>
-      </a:schemeClr>
-    </dgm:linClrLst>
-    <dgm:effectClrLst/>
-    <dgm:txLinClrLst/>
-    <dgm:txFillClrLst meth="repeat">
-      <a:schemeClr val="tx1"/>
-    </dgm:txFillClrLst>
-    <dgm:txEffectClrLst/>
-  </dgm:styleLbl>
-</dgm:colorsDef>
-</file>
-
-<file path=ppt/diagrams/data1.xml><?xml version="1.0" encoding="utf-8"?>
-<dgm:dataModel xmlns:dgm="http://schemas.openxmlformats.org/drawingml/2006/diagram" xmlns:a="http://schemas.openxmlformats.org/drawingml/2006/main">
-  <dgm:ptLst>
-    <dgm:pt modelId="{CE4F20A4-1DF0-1E49-B29A-FE881758550E}" type="doc">
-      <dgm:prSet loTypeId="urn:microsoft.com/office/officeart/2005/8/layout/hierarchy1" loCatId="" qsTypeId="urn:microsoft.com/office/officeart/2005/8/quickstyle/simple1" qsCatId="simple" csTypeId="urn:microsoft.com/office/officeart/2005/8/colors/accent1_2" csCatId="accent1" phldr="1"/>
-      <dgm:spPr/>
-      <dgm:t>
-        <a:bodyPr/>
-        <a:lstStyle/>
-        <a:p>
-          <a:endParaRPr lang="en-GB"/>
-        </a:p>
-      </dgm:t>
-    </dgm:pt>
-    <dgm:pt modelId="{FB04F21B-2D7B-4943-87D0-60B1C80880A3}">
-      <dgm:prSet phldrT="[Text]"/>
-      <dgm:spPr/>
-      <dgm:t>
-        <a:bodyPr/>
-        <a:lstStyle/>
-        <a:p>
-          <a:r>
-            <a:rPr lang="en-GB" dirty="0"/>
-            <a:t>root</a:t>
-          </a:r>
-        </a:p>
-      </dgm:t>
-    </dgm:pt>
-    <dgm:pt modelId="{8880A679-5829-D140-A9AD-370C69FE058D}" type="parTrans" cxnId="{0119DBAE-18EA-084A-8FC8-62094942AB15}">
-      <dgm:prSet/>
-      <dgm:spPr/>
-      <dgm:t>
-        <a:bodyPr/>
-        <a:lstStyle/>
-        <a:p>
-          <a:endParaRPr lang="en-GB"/>
-        </a:p>
-      </dgm:t>
-    </dgm:pt>
-    <dgm:pt modelId="{4A1FBB66-AC1A-1F43-859C-F049852D8E6A}" type="sibTrans" cxnId="{0119DBAE-18EA-084A-8FC8-62094942AB15}">
-      <dgm:prSet/>
-      <dgm:spPr/>
-      <dgm:t>
-        <a:bodyPr/>
-        <a:lstStyle/>
-        <a:p>
-          <a:endParaRPr lang="en-GB"/>
-        </a:p>
-      </dgm:t>
-    </dgm:pt>
-    <dgm:pt modelId="{97613747-5F0C-A04F-B9A5-2EB447A6B92C}">
-      <dgm:prSet phldrT="[Text]"/>
-      <dgm:spPr/>
-      <dgm:t>
-        <a:bodyPr/>
-        <a:lstStyle/>
-        <a:p>
-          <a:r>
-            <a:rPr lang="en-GB" dirty="0" err="1"/>
-            <a:t>PoP</a:t>
-          </a:r>
-          <a:endParaRPr lang="en-GB" dirty="0"/>
-        </a:p>
-      </dgm:t>
-    </dgm:pt>
-    <dgm:pt modelId="{A87EA698-11CD-4B4E-AC4E-EF5C20738FEB}" type="parTrans" cxnId="{43270220-1378-8E4B-92A0-8FB2AE5B549F}">
-      <dgm:prSet/>
-      <dgm:spPr/>
-      <dgm:t>
-        <a:bodyPr/>
-        <a:lstStyle/>
-        <a:p>
-          <a:endParaRPr lang="en-GB"/>
-        </a:p>
-      </dgm:t>
-    </dgm:pt>
-    <dgm:pt modelId="{4CF4F73D-E603-184E-B76A-C280CD9C43EC}" type="sibTrans" cxnId="{43270220-1378-8E4B-92A0-8FB2AE5B549F}">
-      <dgm:prSet/>
-      <dgm:spPr/>
-      <dgm:t>
-        <a:bodyPr/>
-        <a:lstStyle/>
-        <a:p>
-          <a:endParaRPr lang="en-GB"/>
-        </a:p>
-      </dgm:t>
-    </dgm:pt>
-    <dgm:pt modelId="{B1635B5B-4F5C-4E44-9378-0A81DFD6DEEF}">
-      <dgm:prSet phldrT="[Text]"/>
-      <dgm:spPr/>
-      <dgm:t>
-        <a:bodyPr/>
-        <a:lstStyle/>
-        <a:p>
-          <a:r>
-            <a:rPr lang="en-GB" dirty="0"/>
-            <a:t>1g</a:t>
-          </a:r>
-        </a:p>
-      </dgm:t>
-    </dgm:pt>
-    <dgm:pt modelId="{97CAF778-AD97-5E4D-A01F-CED07063AA2E}" type="parTrans" cxnId="{48C29974-A3A5-054C-81AA-EA24C0D7331E}">
-      <dgm:prSet/>
-      <dgm:spPr/>
-      <dgm:t>
-        <a:bodyPr/>
-        <a:lstStyle/>
-        <a:p>
-          <a:endParaRPr lang="en-GB"/>
-        </a:p>
-      </dgm:t>
-    </dgm:pt>
-    <dgm:pt modelId="{BA46905D-5277-2348-A3EC-44A6383871BC}" type="sibTrans" cxnId="{48C29974-A3A5-054C-81AA-EA24C0D7331E}">
-      <dgm:prSet/>
-      <dgm:spPr/>
-      <dgm:t>
-        <a:bodyPr/>
-        <a:lstStyle/>
-        <a:p>
-          <a:endParaRPr lang="en-GB"/>
-        </a:p>
-      </dgm:t>
-    </dgm:pt>
-    <dgm:pt modelId="{2E3D9858-7F58-9843-8666-D7193E403374}">
-      <dgm:prSet phldrT="[Text]"/>
-      <dgm:spPr/>
-      <dgm:t>
-        <a:bodyPr/>
-        <a:lstStyle/>
-        <a:p>
-          <a:r>
-            <a:rPr lang="en-GB" dirty="0"/>
-            <a:t>2i</a:t>
-          </a:r>
-        </a:p>
-      </dgm:t>
-    </dgm:pt>
-    <dgm:pt modelId="{C68C9127-42F6-C54D-B100-B1C2541F2E37}" type="parTrans" cxnId="{C243A6DA-5B9C-3F40-A71A-87A8B44E48D0}">
-      <dgm:prSet/>
-      <dgm:spPr/>
-      <dgm:t>
-        <a:bodyPr/>
-        <a:lstStyle/>
-        <a:p>
-          <a:endParaRPr lang="en-GB"/>
-        </a:p>
-      </dgm:t>
-    </dgm:pt>
-    <dgm:pt modelId="{CD8610E1-A62F-4348-B808-99EADD141DED}" type="sibTrans" cxnId="{C243A6DA-5B9C-3F40-A71A-87A8B44E48D0}">
-      <dgm:prSet/>
-      <dgm:spPr/>
-      <dgm:t>
-        <a:bodyPr/>
-        <a:lstStyle/>
-        <a:p>
-          <a:endParaRPr lang="en-GB"/>
-        </a:p>
-      </dgm:t>
-    </dgm:pt>
-    <dgm:pt modelId="{A7AF5410-273C-BE4C-A531-EB39E883FA47}">
-      <dgm:prSet phldrT="[Text]"/>
-      <dgm:spPr/>
-      <dgm:t>
-        <a:bodyPr/>
-        <a:lstStyle/>
-        <a:p>
-          <a:r>
-            <a:rPr lang="en-GB" dirty="0"/>
-            <a:t>...</a:t>
-          </a:r>
-        </a:p>
-      </dgm:t>
-    </dgm:pt>
-    <dgm:pt modelId="{D1F1969D-E35D-4D42-A41D-ED6A8B367204}" type="parTrans" cxnId="{03EA131E-5A20-224F-8C0E-4727006040C7}">
-      <dgm:prSet/>
-      <dgm:spPr/>
-      <dgm:t>
-        <a:bodyPr/>
-        <a:lstStyle/>
-        <a:p>
-          <a:endParaRPr lang="en-GB"/>
-        </a:p>
-      </dgm:t>
-    </dgm:pt>
-    <dgm:pt modelId="{2248CDE7-DEE2-6B4C-82CB-7ED8864C3FEB}" type="sibTrans" cxnId="{03EA131E-5A20-224F-8C0E-4727006040C7}">
-      <dgm:prSet/>
-      <dgm:spPr/>
-      <dgm:t>
-        <a:bodyPr/>
-        <a:lstStyle/>
-        <a:p>
-          <a:endParaRPr lang="en-GB"/>
-        </a:p>
-      </dgm:t>
-    </dgm:pt>
-    <dgm:pt modelId="{973CE5D7-453B-F242-8585-5C2A8A03D1C1}" type="pres">
-      <dgm:prSet presAssocID="{CE4F20A4-1DF0-1E49-B29A-FE881758550E}" presName="hierChild1" presStyleCnt="0">
-        <dgm:presLayoutVars>
-          <dgm:chPref val="1"/>
-          <dgm:dir/>
-          <dgm:animOne val="branch"/>
-          <dgm:animLvl val="lvl"/>
-          <dgm:resizeHandles/>
-        </dgm:presLayoutVars>
-      </dgm:prSet>
-      <dgm:spPr/>
-    </dgm:pt>
-    <dgm:pt modelId="{B9BAAFD9-1489-CE47-951F-A3890CB84C7E}" type="pres">
-      <dgm:prSet presAssocID="{FB04F21B-2D7B-4943-87D0-60B1C80880A3}" presName="hierRoot1" presStyleCnt="0"/>
-      <dgm:spPr/>
-    </dgm:pt>
-    <dgm:pt modelId="{F84CACB8-3237-E648-8681-2337D2AB0051}" type="pres">
-      <dgm:prSet presAssocID="{FB04F21B-2D7B-4943-87D0-60B1C80880A3}" presName="composite" presStyleCnt="0"/>
-      <dgm:spPr/>
-    </dgm:pt>
-    <dgm:pt modelId="{F371A2DE-E2A1-2146-B291-8C1173000D22}" type="pres">
-      <dgm:prSet presAssocID="{FB04F21B-2D7B-4943-87D0-60B1C80880A3}" presName="background" presStyleLbl="node0" presStyleIdx="0" presStyleCnt="1"/>
-      <dgm:spPr/>
-    </dgm:pt>
-    <dgm:pt modelId="{C01F8056-1083-A245-BDAD-6D6CA91D8F04}" type="pres">
-      <dgm:prSet presAssocID="{FB04F21B-2D7B-4943-87D0-60B1C80880A3}" presName="text" presStyleLbl="fgAcc0" presStyleIdx="0" presStyleCnt="1">
-        <dgm:presLayoutVars>
-          <dgm:chPref val="3"/>
-        </dgm:presLayoutVars>
-      </dgm:prSet>
-      <dgm:spPr/>
-    </dgm:pt>
-    <dgm:pt modelId="{ADDECDFB-E686-434E-B76F-26C4231E51C6}" type="pres">
-      <dgm:prSet presAssocID="{FB04F21B-2D7B-4943-87D0-60B1C80880A3}" presName="hierChild2" presStyleCnt="0"/>
-      <dgm:spPr/>
-    </dgm:pt>
-    <dgm:pt modelId="{6CE70598-95FE-B241-A786-8BDB40F7C6FB}" type="pres">
-      <dgm:prSet presAssocID="{A87EA698-11CD-4B4E-AC4E-EF5C20738FEB}" presName="Name10" presStyleLbl="parChTrans1D2" presStyleIdx="0" presStyleCnt="2"/>
-      <dgm:spPr/>
-    </dgm:pt>
-    <dgm:pt modelId="{675EB2E4-2C68-C045-ACC9-F4239A02271E}" type="pres">
-      <dgm:prSet presAssocID="{97613747-5F0C-A04F-B9A5-2EB447A6B92C}" presName="hierRoot2" presStyleCnt="0"/>
-      <dgm:spPr/>
-    </dgm:pt>
-    <dgm:pt modelId="{7EDE9753-8798-3C41-BB5B-FBDA8A22F59C}" type="pres">
-      <dgm:prSet presAssocID="{97613747-5F0C-A04F-B9A5-2EB447A6B92C}" presName="composite2" presStyleCnt="0"/>
-      <dgm:spPr/>
-    </dgm:pt>
-    <dgm:pt modelId="{B6D9CF39-0964-2048-AC6F-79AA7FBABDAA}" type="pres">
-      <dgm:prSet presAssocID="{97613747-5F0C-A04F-B9A5-2EB447A6B92C}" presName="background2" presStyleLbl="node2" presStyleIdx="0" presStyleCnt="2"/>
-      <dgm:spPr/>
-    </dgm:pt>
-    <dgm:pt modelId="{2973D54F-B7E5-8943-BEE2-999C3625C9FB}" type="pres">
-      <dgm:prSet presAssocID="{97613747-5F0C-A04F-B9A5-2EB447A6B92C}" presName="text2" presStyleLbl="fgAcc2" presStyleIdx="0" presStyleCnt="2">
-        <dgm:presLayoutVars>
-          <dgm:chPref val="3"/>
-        </dgm:presLayoutVars>
-      </dgm:prSet>
-      <dgm:spPr/>
-    </dgm:pt>
-    <dgm:pt modelId="{B1909D2B-65C2-3949-A675-38C2A99E65E5}" type="pres">
-      <dgm:prSet presAssocID="{97613747-5F0C-A04F-B9A5-2EB447A6B92C}" presName="hierChild3" presStyleCnt="0"/>
-      <dgm:spPr/>
-    </dgm:pt>
-    <dgm:pt modelId="{547EBF5A-B0B7-4F45-BAB0-4E874250E24B}" type="pres">
-      <dgm:prSet presAssocID="{97CAF778-AD97-5E4D-A01F-CED07063AA2E}" presName="Name17" presStyleLbl="parChTrans1D3" presStyleIdx="0" presStyleCnt="2"/>
-      <dgm:spPr/>
-    </dgm:pt>
-    <dgm:pt modelId="{C3CD9511-DE91-2640-8F5F-8C88BF4EA4B1}" type="pres">
-      <dgm:prSet presAssocID="{B1635B5B-4F5C-4E44-9378-0A81DFD6DEEF}" presName="hierRoot3" presStyleCnt="0"/>
-      <dgm:spPr/>
-    </dgm:pt>
-    <dgm:pt modelId="{CD5BF83A-B30F-F540-9180-AB15C4B427BE}" type="pres">
-      <dgm:prSet presAssocID="{B1635B5B-4F5C-4E44-9378-0A81DFD6DEEF}" presName="composite3" presStyleCnt="0"/>
-      <dgm:spPr/>
-    </dgm:pt>
-    <dgm:pt modelId="{148693FC-A487-8A4B-8BF4-6B4DD89A580F}" type="pres">
-      <dgm:prSet presAssocID="{B1635B5B-4F5C-4E44-9378-0A81DFD6DEEF}" presName="background3" presStyleLbl="node3" presStyleIdx="0" presStyleCnt="2"/>
-      <dgm:spPr/>
-    </dgm:pt>
-    <dgm:pt modelId="{A8F1EA25-BC50-474C-B3A2-AAE5024B4056}" type="pres">
-      <dgm:prSet presAssocID="{B1635B5B-4F5C-4E44-9378-0A81DFD6DEEF}" presName="text3" presStyleLbl="fgAcc3" presStyleIdx="0" presStyleCnt="2">
-        <dgm:presLayoutVars>
-          <dgm:chPref val="3"/>
-        </dgm:presLayoutVars>
-      </dgm:prSet>
-      <dgm:spPr/>
-    </dgm:pt>
-    <dgm:pt modelId="{A7FADCC0-57CD-EF41-9EC9-F8EC99181AF3}" type="pres">
-      <dgm:prSet presAssocID="{B1635B5B-4F5C-4E44-9378-0A81DFD6DEEF}" presName="hierChild4" presStyleCnt="0"/>
-      <dgm:spPr/>
-    </dgm:pt>
-    <dgm:pt modelId="{F0A48DE0-FB9C-4942-A334-99B946CF4068}" type="pres">
-      <dgm:prSet presAssocID="{C68C9127-42F6-C54D-B100-B1C2541F2E37}" presName="Name17" presStyleLbl="parChTrans1D3" presStyleIdx="1" presStyleCnt="2"/>
-      <dgm:spPr/>
-    </dgm:pt>
-    <dgm:pt modelId="{0F8CEA85-E511-9744-B1BC-2753F3874A08}" type="pres">
-      <dgm:prSet presAssocID="{2E3D9858-7F58-9843-8666-D7193E403374}" presName="hierRoot3" presStyleCnt="0"/>
-      <dgm:spPr/>
-    </dgm:pt>
-    <dgm:pt modelId="{F3BD13EE-D1E2-4F43-A70C-1E0AACAF4DD3}" type="pres">
-      <dgm:prSet presAssocID="{2E3D9858-7F58-9843-8666-D7193E403374}" presName="composite3" presStyleCnt="0"/>
-      <dgm:spPr/>
-    </dgm:pt>
-    <dgm:pt modelId="{EA14BB45-A785-4144-9A19-278018D66CC7}" type="pres">
-      <dgm:prSet presAssocID="{2E3D9858-7F58-9843-8666-D7193E403374}" presName="background3" presStyleLbl="node3" presStyleIdx="1" presStyleCnt="2"/>
-      <dgm:spPr/>
-    </dgm:pt>
-    <dgm:pt modelId="{2A342ED3-E4AB-1C46-8103-202847B1289B}" type="pres">
-      <dgm:prSet presAssocID="{2E3D9858-7F58-9843-8666-D7193E403374}" presName="text3" presStyleLbl="fgAcc3" presStyleIdx="1" presStyleCnt="2">
-        <dgm:presLayoutVars>
-          <dgm:chPref val="3"/>
-        </dgm:presLayoutVars>
-      </dgm:prSet>
-      <dgm:spPr/>
-    </dgm:pt>
-    <dgm:pt modelId="{76D2C7ED-D601-DA43-9A36-0DE8D5210BB6}" type="pres">
-      <dgm:prSet presAssocID="{2E3D9858-7F58-9843-8666-D7193E403374}" presName="hierChild4" presStyleCnt="0"/>
-      <dgm:spPr/>
-    </dgm:pt>
-    <dgm:pt modelId="{8743B5E1-9E58-DB41-B225-3937F57BD47E}" type="pres">
-      <dgm:prSet presAssocID="{D1F1969D-E35D-4D42-A41D-ED6A8B367204}" presName="Name10" presStyleLbl="parChTrans1D2" presStyleIdx="1" presStyleCnt="2"/>
-      <dgm:spPr/>
-    </dgm:pt>
-    <dgm:pt modelId="{57517774-B951-5749-A4DB-86FEAD5215E5}" type="pres">
-      <dgm:prSet presAssocID="{A7AF5410-273C-BE4C-A531-EB39E883FA47}" presName="hierRoot2" presStyleCnt="0"/>
-      <dgm:spPr/>
-    </dgm:pt>
-    <dgm:pt modelId="{3A4FD690-65A1-B34C-9C91-61C805AA8BE1}" type="pres">
-      <dgm:prSet presAssocID="{A7AF5410-273C-BE4C-A531-EB39E883FA47}" presName="composite2" presStyleCnt="0"/>
-      <dgm:spPr/>
-    </dgm:pt>
-    <dgm:pt modelId="{F1FE6B36-40B5-3046-8994-6623EA53D0E1}" type="pres">
-      <dgm:prSet presAssocID="{A7AF5410-273C-BE4C-A531-EB39E883FA47}" presName="background2" presStyleLbl="node2" presStyleIdx="1" presStyleCnt="2"/>
-      <dgm:spPr/>
-    </dgm:pt>
-    <dgm:pt modelId="{17D60C5A-52BD-EE4B-B148-562261455075}" type="pres">
-      <dgm:prSet presAssocID="{A7AF5410-273C-BE4C-A531-EB39E883FA47}" presName="text2" presStyleLbl="fgAcc2" presStyleIdx="1" presStyleCnt="2">
-        <dgm:presLayoutVars>
-          <dgm:chPref val="3"/>
-        </dgm:presLayoutVars>
-      </dgm:prSet>
-      <dgm:spPr/>
-    </dgm:pt>
-    <dgm:pt modelId="{E6B23E01-2AC7-7B42-A63A-0E2EBB196208}" type="pres">
-      <dgm:prSet presAssocID="{A7AF5410-273C-BE4C-A531-EB39E883FA47}" presName="hierChild3" presStyleCnt="0"/>
-      <dgm:spPr/>
-    </dgm:pt>
-  </dgm:ptLst>
-  <dgm:cxnLst>
-    <dgm:cxn modelId="{6A39B712-A88A-4043-B4A4-8504617D7FA6}" type="presOf" srcId="{A87EA698-11CD-4B4E-AC4E-EF5C20738FEB}" destId="{6CE70598-95FE-B241-A786-8BDB40F7C6FB}" srcOrd="0" destOrd="0" presId="urn:microsoft.com/office/officeart/2005/8/layout/hierarchy1"/>
-    <dgm:cxn modelId="{03EA131E-5A20-224F-8C0E-4727006040C7}" srcId="{FB04F21B-2D7B-4943-87D0-60B1C80880A3}" destId="{A7AF5410-273C-BE4C-A531-EB39E883FA47}" srcOrd="1" destOrd="0" parTransId="{D1F1969D-E35D-4D42-A41D-ED6A8B367204}" sibTransId="{2248CDE7-DEE2-6B4C-82CB-7ED8864C3FEB}"/>
-    <dgm:cxn modelId="{43270220-1378-8E4B-92A0-8FB2AE5B549F}" srcId="{FB04F21B-2D7B-4943-87D0-60B1C80880A3}" destId="{97613747-5F0C-A04F-B9A5-2EB447A6B92C}" srcOrd="0" destOrd="0" parTransId="{A87EA698-11CD-4B4E-AC4E-EF5C20738FEB}" sibTransId="{4CF4F73D-E603-184E-B76A-C280CD9C43EC}"/>
-    <dgm:cxn modelId="{28AC2B56-7D4E-134E-9C03-736950193B4C}" type="presOf" srcId="{A7AF5410-273C-BE4C-A531-EB39E883FA47}" destId="{17D60C5A-52BD-EE4B-B148-562261455075}" srcOrd="0" destOrd="0" presId="urn:microsoft.com/office/officeart/2005/8/layout/hierarchy1"/>
-    <dgm:cxn modelId="{81B0D967-2851-D94C-8923-F6A7EB0CD77A}" type="presOf" srcId="{97CAF778-AD97-5E4D-A01F-CED07063AA2E}" destId="{547EBF5A-B0B7-4F45-BAB0-4E874250E24B}" srcOrd="0" destOrd="0" presId="urn:microsoft.com/office/officeart/2005/8/layout/hierarchy1"/>
-    <dgm:cxn modelId="{8752CA6D-984A-3848-8173-9FB643D129BD}" type="presOf" srcId="{C68C9127-42F6-C54D-B100-B1C2541F2E37}" destId="{F0A48DE0-FB9C-4942-A334-99B946CF4068}" srcOrd="0" destOrd="0" presId="urn:microsoft.com/office/officeart/2005/8/layout/hierarchy1"/>
-    <dgm:cxn modelId="{48C29974-A3A5-054C-81AA-EA24C0D7331E}" srcId="{97613747-5F0C-A04F-B9A5-2EB447A6B92C}" destId="{B1635B5B-4F5C-4E44-9378-0A81DFD6DEEF}" srcOrd="0" destOrd="0" parTransId="{97CAF778-AD97-5E4D-A01F-CED07063AA2E}" sibTransId="{BA46905D-5277-2348-A3EC-44A6383871BC}"/>
-    <dgm:cxn modelId="{0119DBAE-18EA-084A-8FC8-62094942AB15}" srcId="{CE4F20A4-1DF0-1E49-B29A-FE881758550E}" destId="{FB04F21B-2D7B-4943-87D0-60B1C80880A3}" srcOrd="0" destOrd="0" parTransId="{8880A679-5829-D140-A9AD-370C69FE058D}" sibTransId="{4A1FBB66-AC1A-1F43-859C-F049852D8E6A}"/>
-    <dgm:cxn modelId="{09830CBC-EBFD-314C-900A-9B590B78FE66}" type="presOf" srcId="{D1F1969D-E35D-4D42-A41D-ED6A8B367204}" destId="{8743B5E1-9E58-DB41-B225-3937F57BD47E}" srcOrd="0" destOrd="0" presId="urn:microsoft.com/office/officeart/2005/8/layout/hierarchy1"/>
-    <dgm:cxn modelId="{9B0233CD-A86F-E846-AB96-4D5FBF4AA1E8}" type="presOf" srcId="{CE4F20A4-1DF0-1E49-B29A-FE881758550E}" destId="{973CE5D7-453B-F242-8585-5C2A8A03D1C1}" srcOrd="0" destOrd="0" presId="urn:microsoft.com/office/officeart/2005/8/layout/hierarchy1"/>
-    <dgm:cxn modelId="{EF1E04D8-A2D3-8249-9B52-45F7A7F47F3A}" type="presOf" srcId="{2E3D9858-7F58-9843-8666-D7193E403374}" destId="{2A342ED3-E4AB-1C46-8103-202847B1289B}" srcOrd="0" destOrd="0" presId="urn:microsoft.com/office/officeart/2005/8/layout/hierarchy1"/>
-    <dgm:cxn modelId="{BFBE56DA-2F54-FD42-9C0B-DDD2A8BE4886}" type="presOf" srcId="{FB04F21B-2D7B-4943-87D0-60B1C80880A3}" destId="{C01F8056-1083-A245-BDAD-6D6CA91D8F04}" srcOrd="0" destOrd="0" presId="urn:microsoft.com/office/officeart/2005/8/layout/hierarchy1"/>
-    <dgm:cxn modelId="{C243A6DA-5B9C-3F40-A71A-87A8B44E48D0}" srcId="{97613747-5F0C-A04F-B9A5-2EB447A6B92C}" destId="{2E3D9858-7F58-9843-8666-D7193E403374}" srcOrd="1" destOrd="0" parTransId="{C68C9127-42F6-C54D-B100-B1C2541F2E37}" sibTransId="{CD8610E1-A62F-4348-B808-99EADD141DED}"/>
-    <dgm:cxn modelId="{F98099F5-D4A1-AC4F-A458-1B9A15A669CD}" type="presOf" srcId="{B1635B5B-4F5C-4E44-9378-0A81DFD6DEEF}" destId="{A8F1EA25-BC50-474C-B3A2-AAE5024B4056}" srcOrd="0" destOrd="0" presId="urn:microsoft.com/office/officeart/2005/8/layout/hierarchy1"/>
-    <dgm:cxn modelId="{227AF7F5-3A42-8E44-B403-3F06357CC665}" type="presOf" srcId="{97613747-5F0C-A04F-B9A5-2EB447A6B92C}" destId="{2973D54F-B7E5-8943-BEE2-999C3625C9FB}" srcOrd="0" destOrd="0" presId="urn:microsoft.com/office/officeart/2005/8/layout/hierarchy1"/>
-    <dgm:cxn modelId="{442FDEB0-5BA1-D747-B86B-24061D1A689A}" type="presParOf" srcId="{973CE5D7-453B-F242-8585-5C2A8A03D1C1}" destId="{B9BAAFD9-1489-CE47-951F-A3890CB84C7E}" srcOrd="0" destOrd="0" presId="urn:microsoft.com/office/officeart/2005/8/layout/hierarchy1"/>
-    <dgm:cxn modelId="{065B87D6-4656-8040-A44B-C165F827FDA3}" type="presParOf" srcId="{B9BAAFD9-1489-CE47-951F-A3890CB84C7E}" destId="{F84CACB8-3237-E648-8681-2337D2AB0051}" srcOrd="0" destOrd="0" presId="urn:microsoft.com/office/officeart/2005/8/layout/hierarchy1"/>
-    <dgm:cxn modelId="{EB0C6B0E-76C2-2849-95BF-7ECF9F61A7F1}" type="presParOf" srcId="{F84CACB8-3237-E648-8681-2337D2AB0051}" destId="{F371A2DE-E2A1-2146-B291-8C1173000D22}" srcOrd="0" destOrd="0" presId="urn:microsoft.com/office/officeart/2005/8/layout/hierarchy1"/>
-    <dgm:cxn modelId="{8A06013A-6CF7-2E40-9186-BE339D710690}" type="presParOf" srcId="{F84CACB8-3237-E648-8681-2337D2AB0051}" destId="{C01F8056-1083-A245-BDAD-6D6CA91D8F04}" srcOrd="1" destOrd="0" presId="urn:microsoft.com/office/officeart/2005/8/layout/hierarchy1"/>
-    <dgm:cxn modelId="{BF967777-8E2B-A341-AFCB-ECEF292A7CD0}" type="presParOf" srcId="{B9BAAFD9-1489-CE47-951F-A3890CB84C7E}" destId="{ADDECDFB-E686-434E-B76F-26C4231E51C6}" srcOrd="1" destOrd="0" presId="urn:microsoft.com/office/officeart/2005/8/layout/hierarchy1"/>
-    <dgm:cxn modelId="{1387E8E5-0ED7-C844-A452-40B0486D2157}" type="presParOf" srcId="{ADDECDFB-E686-434E-B76F-26C4231E51C6}" destId="{6CE70598-95FE-B241-A786-8BDB40F7C6FB}" srcOrd="0" destOrd="0" presId="urn:microsoft.com/office/officeart/2005/8/layout/hierarchy1"/>
-    <dgm:cxn modelId="{AFC6714D-8549-114D-8D8F-612DA93FA8E6}" type="presParOf" srcId="{ADDECDFB-E686-434E-B76F-26C4231E51C6}" destId="{675EB2E4-2C68-C045-ACC9-F4239A02271E}" srcOrd="1" destOrd="0" presId="urn:microsoft.com/office/officeart/2005/8/layout/hierarchy1"/>
-    <dgm:cxn modelId="{BFA2376F-5AAF-7E4E-BEC1-79688DA2060C}" type="presParOf" srcId="{675EB2E4-2C68-C045-ACC9-F4239A02271E}" destId="{7EDE9753-8798-3C41-BB5B-FBDA8A22F59C}" srcOrd="0" destOrd="0" presId="urn:microsoft.com/office/officeart/2005/8/layout/hierarchy1"/>
-    <dgm:cxn modelId="{80A0F8BC-736F-D04D-B031-A6D650CA5DDC}" type="presParOf" srcId="{7EDE9753-8798-3C41-BB5B-FBDA8A22F59C}" destId="{B6D9CF39-0964-2048-AC6F-79AA7FBABDAA}" srcOrd="0" destOrd="0" presId="urn:microsoft.com/office/officeart/2005/8/layout/hierarchy1"/>
-    <dgm:cxn modelId="{86BFD293-7C1D-9345-80C2-D6A7ADA7BA28}" type="presParOf" srcId="{7EDE9753-8798-3C41-BB5B-FBDA8A22F59C}" destId="{2973D54F-B7E5-8943-BEE2-999C3625C9FB}" srcOrd="1" destOrd="0" presId="urn:microsoft.com/office/officeart/2005/8/layout/hierarchy1"/>
-    <dgm:cxn modelId="{97638117-CCE9-9942-BEBF-B083256FBEB3}" type="presParOf" srcId="{675EB2E4-2C68-C045-ACC9-F4239A02271E}" destId="{B1909D2B-65C2-3949-A675-38C2A99E65E5}" srcOrd="1" destOrd="0" presId="urn:microsoft.com/office/officeart/2005/8/layout/hierarchy1"/>
-    <dgm:cxn modelId="{3B00A953-E5E1-A449-8065-7EF9F47A5025}" type="presParOf" srcId="{B1909D2B-65C2-3949-A675-38C2A99E65E5}" destId="{547EBF5A-B0B7-4F45-BAB0-4E874250E24B}" srcOrd="0" destOrd="0" presId="urn:microsoft.com/office/officeart/2005/8/layout/hierarchy1"/>
-    <dgm:cxn modelId="{834E9877-9517-1D48-B1C8-4F49D067836D}" type="presParOf" srcId="{B1909D2B-65C2-3949-A675-38C2A99E65E5}" destId="{C3CD9511-DE91-2640-8F5F-8C88BF4EA4B1}" srcOrd="1" destOrd="0" presId="urn:microsoft.com/office/officeart/2005/8/layout/hierarchy1"/>
-    <dgm:cxn modelId="{1C9CC5AB-B78D-8149-9B72-B37ACC96375D}" type="presParOf" srcId="{C3CD9511-DE91-2640-8F5F-8C88BF4EA4B1}" destId="{CD5BF83A-B30F-F540-9180-AB15C4B427BE}" srcOrd="0" destOrd="0" presId="urn:microsoft.com/office/officeart/2005/8/layout/hierarchy1"/>
-    <dgm:cxn modelId="{57310EAC-D93D-834D-8C6F-A453F9376094}" type="presParOf" srcId="{CD5BF83A-B30F-F540-9180-AB15C4B427BE}" destId="{148693FC-A487-8A4B-8BF4-6B4DD89A580F}" srcOrd="0" destOrd="0" presId="urn:microsoft.com/office/officeart/2005/8/layout/hierarchy1"/>
-    <dgm:cxn modelId="{8BCD0319-637D-BE47-BA56-B1554F2C1DBD}" type="presParOf" srcId="{CD5BF83A-B30F-F540-9180-AB15C4B427BE}" destId="{A8F1EA25-BC50-474C-B3A2-AAE5024B4056}" srcOrd="1" destOrd="0" presId="urn:microsoft.com/office/officeart/2005/8/layout/hierarchy1"/>
-    <dgm:cxn modelId="{824EA819-FF26-064B-A6EC-7A4421BA6EB2}" type="presParOf" srcId="{C3CD9511-DE91-2640-8F5F-8C88BF4EA4B1}" destId="{A7FADCC0-57CD-EF41-9EC9-F8EC99181AF3}" srcOrd="1" destOrd="0" presId="urn:microsoft.com/office/officeart/2005/8/layout/hierarchy1"/>
-    <dgm:cxn modelId="{5A58029A-75AD-CF43-80FB-6C2C1524281A}" type="presParOf" srcId="{B1909D2B-65C2-3949-A675-38C2A99E65E5}" destId="{F0A48DE0-FB9C-4942-A334-99B946CF4068}" srcOrd="2" destOrd="0" presId="urn:microsoft.com/office/officeart/2005/8/layout/hierarchy1"/>
-    <dgm:cxn modelId="{6E0177D4-28E5-AE41-9041-BDB68057506C}" type="presParOf" srcId="{B1909D2B-65C2-3949-A675-38C2A99E65E5}" destId="{0F8CEA85-E511-9744-B1BC-2753F3874A08}" srcOrd="3" destOrd="0" presId="urn:microsoft.com/office/officeart/2005/8/layout/hierarchy1"/>
-    <dgm:cxn modelId="{DB0DBA50-B1CC-DC40-97AE-3681BD0EA873}" type="presParOf" srcId="{0F8CEA85-E511-9744-B1BC-2753F3874A08}" destId="{F3BD13EE-D1E2-4F43-A70C-1E0AACAF4DD3}" srcOrd="0" destOrd="0" presId="urn:microsoft.com/office/officeart/2005/8/layout/hierarchy1"/>
-    <dgm:cxn modelId="{6560B44B-8354-074F-94B7-38DCC1004039}" type="presParOf" srcId="{F3BD13EE-D1E2-4F43-A70C-1E0AACAF4DD3}" destId="{EA14BB45-A785-4144-9A19-278018D66CC7}" srcOrd="0" destOrd="0" presId="urn:microsoft.com/office/officeart/2005/8/layout/hierarchy1"/>
-    <dgm:cxn modelId="{FF5720D4-885E-BA43-A16F-2F53E86D5D47}" type="presParOf" srcId="{F3BD13EE-D1E2-4F43-A70C-1E0AACAF4DD3}" destId="{2A342ED3-E4AB-1C46-8103-202847B1289B}" srcOrd="1" destOrd="0" presId="urn:microsoft.com/office/officeart/2005/8/layout/hierarchy1"/>
-    <dgm:cxn modelId="{605A4C92-A383-0A48-ACC9-46387D346407}" type="presParOf" srcId="{0F8CEA85-E511-9744-B1BC-2753F3874A08}" destId="{76D2C7ED-D601-DA43-9A36-0DE8D5210BB6}" srcOrd="1" destOrd="0" presId="urn:microsoft.com/office/officeart/2005/8/layout/hierarchy1"/>
-    <dgm:cxn modelId="{EDEE1125-ECEC-5645-BBDA-2A5A08E2C526}" type="presParOf" srcId="{ADDECDFB-E686-434E-B76F-26C4231E51C6}" destId="{8743B5E1-9E58-DB41-B225-3937F57BD47E}" srcOrd="2" destOrd="0" presId="urn:microsoft.com/office/officeart/2005/8/layout/hierarchy1"/>
-    <dgm:cxn modelId="{B6AEFDAC-9EEC-6D4A-B971-2028B993C787}" type="presParOf" srcId="{ADDECDFB-E686-434E-B76F-26C4231E51C6}" destId="{57517774-B951-5749-A4DB-86FEAD5215E5}" srcOrd="3" destOrd="0" presId="urn:microsoft.com/office/officeart/2005/8/layout/hierarchy1"/>
-    <dgm:cxn modelId="{9B9B0811-45CE-3A4A-ABD3-AA54B48EF5A5}" type="presParOf" srcId="{57517774-B951-5749-A4DB-86FEAD5215E5}" destId="{3A4FD690-65A1-B34C-9C91-61C805AA8BE1}" srcOrd="0" destOrd="0" presId="urn:microsoft.com/office/officeart/2005/8/layout/hierarchy1"/>
-    <dgm:cxn modelId="{9B22FCDF-8185-7247-9937-088A2960AE73}" type="presParOf" srcId="{3A4FD690-65A1-B34C-9C91-61C805AA8BE1}" destId="{F1FE6B36-40B5-3046-8994-6623EA53D0E1}" srcOrd="0" destOrd="0" presId="urn:microsoft.com/office/officeart/2005/8/layout/hierarchy1"/>
-    <dgm:cxn modelId="{90113B6A-854D-5C4E-AE81-C9CFF6FBADB3}" type="presParOf" srcId="{3A4FD690-65A1-B34C-9C91-61C805AA8BE1}" destId="{17D60C5A-52BD-EE4B-B148-562261455075}" srcOrd="1" destOrd="0" presId="urn:microsoft.com/office/officeart/2005/8/layout/hierarchy1"/>
-    <dgm:cxn modelId="{979C8173-E6ED-B947-B9F9-47087FDA6327}" type="presParOf" srcId="{57517774-B951-5749-A4DB-86FEAD5215E5}" destId="{E6B23E01-2AC7-7B42-A63A-0E2EBB196208}" srcOrd="1" destOrd="0" presId="urn:microsoft.com/office/officeart/2005/8/layout/hierarchy1"/>
-  </dgm:cxnLst>
-  <dgm:bg/>
-  <dgm:whole/>
-  <dgm:extLst>
-    <a:ext uri="http://schemas.microsoft.com/office/drawing/2008/diagram">
-      <dsp:dataModelExt xmlns:dsp="http://schemas.microsoft.com/office/drawing/2008/diagram" relId="rId7" minVer="http://schemas.openxmlformats.org/drawingml/2006/diagram"/>
-    </a:ext>
-  </dgm:extLst>
-</dgm:dataModel>
-</file>
-
-<file path=ppt/diagrams/drawing1.xml><?xml version="1.0" encoding="utf-8"?>
-<dsp:drawing xmlns:dgm="http://schemas.openxmlformats.org/drawingml/2006/diagram" xmlns:dsp="http://schemas.microsoft.com/office/drawing/2008/diagram" xmlns:a="http://schemas.openxmlformats.org/drawingml/2006/main">
-  <dsp:spTree>
-    <dsp:nvGrpSpPr>
-      <dsp:cNvPr id="0" name=""/>
-      <dsp:cNvGrpSpPr/>
-    </dsp:nvGrpSpPr>
-    <dsp:grpSpPr/>
-    <dsp:sp modelId="{8743B5E1-9E58-DB41-B225-3937F57BD47E}">
-      <dsp:nvSpPr>
-        <dsp:cNvPr id="0" name=""/>
-        <dsp:cNvSpPr/>
-      </dsp:nvSpPr>
-      <dsp:spPr>
-        <a:xfrm>
-          <a:off x="3099924" y="979867"/>
-          <a:ext cx="940616" cy="447647"/>
-        </a:xfrm>
-        <a:custGeom>
-          <a:avLst/>
-          <a:gdLst/>
-          <a:ahLst/>
-          <a:cxnLst/>
-          <a:rect l="0" t="0" r="0" b="0"/>
-          <a:pathLst>
-            <a:path>
-              <a:moveTo>
-                <a:pt x="0" y="0"/>
-              </a:moveTo>
-              <a:lnTo>
-                <a:pt x="0" y="305058"/>
-              </a:lnTo>
-              <a:lnTo>
-                <a:pt x="940616" y="305058"/>
-              </a:lnTo>
-              <a:lnTo>
-                <a:pt x="940616" y="447647"/>
-              </a:lnTo>
-            </a:path>
-          </a:pathLst>
-        </a:custGeom>
-        <a:noFill/>
-        <a:ln w="12700" cap="flat" cmpd="sng" algn="ctr">
-          <a:solidFill>
-            <a:schemeClr val="accent1">
-              <a:shade val="60000"/>
-              <a:hueOff val="0"/>
-              <a:satOff val="0"/>
-              <a:lumOff val="0"/>
-              <a:alphaOff val="0"/>
-            </a:schemeClr>
-          </a:solidFill>
-          <a:prstDash val="solid"/>
-          <a:miter lim="800000"/>
-        </a:ln>
-        <a:effectLst/>
-      </dsp:spPr>
-      <dsp:style>
-        <a:lnRef idx="2">
-          <a:scrgbClr r="0" g="0" b="0"/>
-        </a:lnRef>
-        <a:fillRef idx="0">
-          <a:scrgbClr r="0" g="0" b="0"/>
-        </a:fillRef>
-        <a:effectRef idx="0">
-          <a:scrgbClr r="0" g="0" b="0"/>
-        </a:effectRef>
-        <a:fontRef idx="minor"/>
-      </dsp:style>
-    </dsp:sp>
-    <dsp:sp modelId="{F0A48DE0-FB9C-4942-A334-99B946CF4068}">
-      <dsp:nvSpPr>
-        <dsp:cNvPr id="0" name=""/>
-        <dsp:cNvSpPr/>
-      </dsp:nvSpPr>
-      <dsp:spPr>
-        <a:xfrm>
-          <a:off x="2159307" y="2404901"/>
-          <a:ext cx="940616" cy="447647"/>
-        </a:xfrm>
-        <a:custGeom>
-          <a:avLst/>
-          <a:gdLst/>
-          <a:ahLst/>
-          <a:cxnLst/>
-          <a:rect l="0" t="0" r="0" b="0"/>
-          <a:pathLst>
-            <a:path>
-              <a:moveTo>
-                <a:pt x="0" y="0"/>
-              </a:moveTo>
-              <a:lnTo>
-                <a:pt x="0" y="305058"/>
-              </a:lnTo>
-              <a:lnTo>
-                <a:pt x="940616" y="305058"/>
-              </a:lnTo>
-              <a:lnTo>
-                <a:pt x="940616" y="447647"/>
-              </a:lnTo>
-            </a:path>
-          </a:pathLst>
-        </a:custGeom>
-        <a:noFill/>
-        <a:ln w="12700" cap="flat" cmpd="sng" algn="ctr">
-          <a:solidFill>
-            <a:schemeClr val="accent1">
-              <a:shade val="80000"/>
-              <a:hueOff val="0"/>
-              <a:satOff val="0"/>
-              <a:lumOff val="0"/>
-              <a:alphaOff val="0"/>
-            </a:schemeClr>
-          </a:solidFill>
-          <a:prstDash val="solid"/>
-          <a:miter lim="800000"/>
-        </a:ln>
-        <a:effectLst/>
-      </dsp:spPr>
-      <dsp:style>
-        <a:lnRef idx="2">
-          <a:scrgbClr r="0" g="0" b="0"/>
-        </a:lnRef>
-        <a:fillRef idx="0">
-          <a:scrgbClr r="0" g="0" b="0"/>
-        </a:fillRef>
-        <a:effectRef idx="0">
-          <a:scrgbClr r="0" g="0" b="0"/>
-        </a:effectRef>
-        <a:fontRef idx="minor"/>
-      </dsp:style>
-    </dsp:sp>
-    <dsp:sp modelId="{547EBF5A-B0B7-4F45-BAB0-4E874250E24B}">
-      <dsp:nvSpPr>
-        <dsp:cNvPr id="0" name=""/>
-        <dsp:cNvSpPr/>
-      </dsp:nvSpPr>
-      <dsp:spPr>
-        <a:xfrm>
-          <a:off x="1218691" y="2404901"/>
-          <a:ext cx="940616" cy="447647"/>
-        </a:xfrm>
-        <a:custGeom>
-          <a:avLst/>
-          <a:gdLst/>
-          <a:ahLst/>
-          <a:cxnLst/>
-          <a:rect l="0" t="0" r="0" b="0"/>
-          <a:pathLst>
-            <a:path>
-              <a:moveTo>
-                <a:pt x="940616" y="0"/>
-              </a:moveTo>
-              <a:lnTo>
-                <a:pt x="940616" y="305058"/>
-              </a:lnTo>
-              <a:lnTo>
-                <a:pt x="0" y="305058"/>
-              </a:lnTo>
-              <a:lnTo>
-                <a:pt x="0" y="447647"/>
-              </a:lnTo>
-            </a:path>
-          </a:pathLst>
-        </a:custGeom>
-        <a:noFill/>
-        <a:ln w="12700" cap="flat" cmpd="sng" algn="ctr">
-          <a:solidFill>
-            <a:schemeClr val="accent1">
-              <a:shade val="80000"/>
-              <a:hueOff val="0"/>
-              <a:satOff val="0"/>
-              <a:lumOff val="0"/>
-              <a:alphaOff val="0"/>
-            </a:schemeClr>
-          </a:solidFill>
-          <a:prstDash val="solid"/>
-          <a:miter lim="800000"/>
-        </a:ln>
-        <a:effectLst/>
-      </dsp:spPr>
-      <dsp:style>
-        <a:lnRef idx="2">
-          <a:scrgbClr r="0" g="0" b="0"/>
-        </a:lnRef>
-        <a:fillRef idx="0">
-          <a:scrgbClr r="0" g="0" b="0"/>
-        </a:fillRef>
-        <a:effectRef idx="0">
-          <a:scrgbClr r="0" g="0" b="0"/>
-        </a:effectRef>
-        <a:fontRef idx="minor"/>
-      </dsp:style>
-    </dsp:sp>
-    <dsp:sp modelId="{6CE70598-95FE-B241-A786-8BDB40F7C6FB}">
-      <dsp:nvSpPr>
-        <dsp:cNvPr id="0" name=""/>
-        <dsp:cNvSpPr/>
-      </dsp:nvSpPr>
-      <dsp:spPr>
-        <a:xfrm>
-          <a:off x="2159307" y="979867"/>
-          <a:ext cx="940616" cy="447647"/>
-        </a:xfrm>
-        <a:custGeom>
-          <a:avLst/>
-          <a:gdLst/>
-          <a:ahLst/>
-          <a:cxnLst/>
-          <a:rect l="0" t="0" r="0" b="0"/>
-          <a:pathLst>
-            <a:path>
-              <a:moveTo>
-                <a:pt x="940616" y="0"/>
-              </a:moveTo>
-              <a:lnTo>
-                <a:pt x="940616" y="305058"/>
-              </a:lnTo>
-              <a:lnTo>
-                <a:pt x="0" y="305058"/>
-              </a:lnTo>
-              <a:lnTo>
-                <a:pt x="0" y="447647"/>
-              </a:lnTo>
-            </a:path>
-          </a:pathLst>
-        </a:custGeom>
-        <a:noFill/>
-        <a:ln w="12700" cap="flat" cmpd="sng" algn="ctr">
-          <a:solidFill>
-            <a:schemeClr val="accent1">
-              <a:shade val="60000"/>
-              <a:hueOff val="0"/>
-              <a:satOff val="0"/>
-              <a:lumOff val="0"/>
-              <a:alphaOff val="0"/>
-            </a:schemeClr>
-          </a:solidFill>
-          <a:prstDash val="solid"/>
-          <a:miter lim="800000"/>
-        </a:ln>
-        <a:effectLst/>
-      </dsp:spPr>
-      <dsp:style>
-        <a:lnRef idx="2">
-          <a:scrgbClr r="0" g="0" b="0"/>
-        </a:lnRef>
-        <a:fillRef idx="0">
-          <a:scrgbClr r="0" g="0" b="0"/>
-        </a:fillRef>
-        <a:effectRef idx="0">
-          <a:scrgbClr r="0" g="0" b="0"/>
-        </a:effectRef>
-        <a:fontRef idx="minor"/>
-      </dsp:style>
-    </dsp:sp>
-    <dsp:sp modelId="{F371A2DE-E2A1-2146-B291-8C1173000D22}">
-      <dsp:nvSpPr>
-        <dsp:cNvPr id="0" name=""/>
-        <dsp:cNvSpPr/>
-      </dsp:nvSpPr>
-      <dsp:spPr>
-        <a:xfrm>
-          <a:off x="2330328" y="2481"/>
-          <a:ext cx="1539190" cy="977385"/>
-        </a:xfrm>
-        <a:prstGeom prst="roundRect">
-          <a:avLst>
-            <a:gd name="adj" fmla="val 10000"/>
-          </a:avLst>
-        </a:prstGeom>
-        <a:solidFill>
-          <a:schemeClr val="accent1">
-            <a:hueOff val="0"/>
-            <a:satOff val="0"/>
-            <a:lumOff val="0"/>
-            <a:alphaOff val="0"/>
-          </a:schemeClr>
-        </a:solidFill>
-        <a:ln w="12700" cap="flat" cmpd="sng" algn="ctr">
-          <a:solidFill>
-            <a:schemeClr val="lt1">
-              <a:hueOff val="0"/>
-              <a:satOff val="0"/>
-              <a:lumOff val="0"/>
-              <a:alphaOff val="0"/>
-            </a:schemeClr>
-          </a:solidFill>
-          <a:prstDash val="solid"/>
-          <a:miter lim="800000"/>
-        </a:ln>
-        <a:effectLst/>
-      </dsp:spPr>
-      <dsp:style>
-        <a:lnRef idx="2">
-          <a:scrgbClr r="0" g="0" b="0"/>
-        </a:lnRef>
-        <a:fillRef idx="1">
-          <a:scrgbClr r="0" g="0" b="0"/>
-        </a:fillRef>
-        <a:effectRef idx="0">
-          <a:scrgbClr r="0" g="0" b="0"/>
-        </a:effectRef>
-        <a:fontRef idx="minor">
-          <a:schemeClr val="lt1"/>
-        </a:fontRef>
-      </dsp:style>
-    </dsp:sp>
-    <dsp:sp modelId="{C01F8056-1083-A245-BDAD-6D6CA91D8F04}">
-      <dsp:nvSpPr>
-        <dsp:cNvPr id="0" name=""/>
-        <dsp:cNvSpPr/>
-      </dsp:nvSpPr>
-      <dsp:spPr>
-        <a:xfrm>
-          <a:off x="2501350" y="164951"/>
-          <a:ext cx="1539190" cy="977385"/>
-        </a:xfrm>
-        <a:prstGeom prst="roundRect">
-          <a:avLst>
-            <a:gd name="adj" fmla="val 10000"/>
-          </a:avLst>
-        </a:prstGeom>
-        <a:solidFill>
-          <a:schemeClr val="lt1">
-            <a:alpha val="90000"/>
-            <a:hueOff val="0"/>
-            <a:satOff val="0"/>
-            <a:lumOff val="0"/>
-            <a:alphaOff val="0"/>
-          </a:schemeClr>
-        </a:solidFill>
-        <a:ln w="12700" cap="flat" cmpd="sng" algn="ctr">
-          <a:solidFill>
-            <a:schemeClr val="accent1">
-              <a:hueOff val="0"/>
-              <a:satOff val="0"/>
-              <a:lumOff val="0"/>
-              <a:alphaOff val="0"/>
-            </a:schemeClr>
-          </a:solidFill>
-          <a:prstDash val="solid"/>
-          <a:miter lim="800000"/>
-        </a:ln>
-        <a:effectLst/>
-      </dsp:spPr>
-      <dsp:style>
-        <a:lnRef idx="2">
-          <a:scrgbClr r="0" g="0" b="0"/>
-        </a:lnRef>
-        <a:fillRef idx="1">
-          <a:scrgbClr r="0" g="0" b="0"/>
-        </a:fillRef>
-        <a:effectRef idx="0">
-          <a:scrgbClr r="0" g="0" b="0"/>
-        </a:effectRef>
-        <a:fontRef idx="minor"/>
-      </dsp:style>
-      <dsp:txBody>
-        <a:bodyPr spcFirstLastPara="0" vert="horz" wrap="square" lIns="160020" tIns="160020" rIns="160020" bIns="160020" numCol="1" spcCol="1270" anchor="ctr" anchorCtr="0">
-          <a:noAutofit/>
-        </a:bodyPr>
-        <a:lstStyle/>
-        <a:p>
-          <a:pPr marL="0" lvl="0" indent="0" algn="ctr" defTabSz="1866900">
-            <a:lnSpc>
-              <a:spcPct val="90000"/>
-            </a:lnSpc>
-            <a:spcBef>
-              <a:spcPct val="0"/>
-            </a:spcBef>
-            <a:spcAft>
-              <a:spcPct val="35000"/>
-            </a:spcAft>
-            <a:buNone/>
-          </a:pPr>
-          <a:r>
-            <a:rPr lang="en-GB" sz="4200" kern="1200" dirty="0"/>
-            <a:t>root</a:t>
-          </a:r>
-        </a:p>
-      </dsp:txBody>
-      <dsp:txXfrm>
-        <a:off x="2529977" y="193578"/>
-        <a:ext cx="1481936" cy="920131"/>
-      </dsp:txXfrm>
-    </dsp:sp>
-    <dsp:sp modelId="{B6D9CF39-0964-2048-AC6F-79AA7FBABDAA}">
-      <dsp:nvSpPr>
-        <dsp:cNvPr id="0" name=""/>
-        <dsp:cNvSpPr/>
-      </dsp:nvSpPr>
-      <dsp:spPr>
-        <a:xfrm>
-          <a:off x="1389712" y="1427515"/>
-          <a:ext cx="1539190" cy="977385"/>
-        </a:xfrm>
-        <a:prstGeom prst="roundRect">
-          <a:avLst>
-            <a:gd name="adj" fmla="val 10000"/>
-          </a:avLst>
-        </a:prstGeom>
-        <a:solidFill>
-          <a:schemeClr val="accent1">
-            <a:hueOff val="0"/>
-            <a:satOff val="0"/>
-            <a:lumOff val="0"/>
-            <a:alphaOff val="0"/>
-          </a:schemeClr>
-        </a:solidFill>
-        <a:ln w="12700" cap="flat" cmpd="sng" algn="ctr">
-          <a:solidFill>
-            <a:schemeClr val="lt1">
-              <a:hueOff val="0"/>
-              <a:satOff val="0"/>
-              <a:lumOff val="0"/>
-              <a:alphaOff val="0"/>
-            </a:schemeClr>
-          </a:solidFill>
-          <a:prstDash val="solid"/>
-          <a:miter lim="800000"/>
-        </a:ln>
-        <a:effectLst/>
-      </dsp:spPr>
-      <dsp:style>
-        <a:lnRef idx="2">
-          <a:scrgbClr r="0" g="0" b="0"/>
-        </a:lnRef>
-        <a:fillRef idx="1">
-          <a:scrgbClr r="0" g="0" b="0"/>
-        </a:fillRef>
-        <a:effectRef idx="0">
-          <a:scrgbClr r="0" g="0" b="0"/>
-        </a:effectRef>
-        <a:fontRef idx="minor">
-          <a:schemeClr val="lt1"/>
-        </a:fontRef>
-      </dsp:style>
-    </dsp:sp>
-    <dsp:sp modelId="{2973D54F-B7E5-8943-BEE2-999C3625C9FB}">
-      <dsp:nvSpPr>
-        <dsp:cNvPr id="0" name=""/>
-        <dsp:cNvSpPr/>
-      </dsp:nvSpPr>
-      <dsp:spPr>
-        <a:xfrm>
-          <a:off x="1560733" y="1589985"/>
-          <a:ext cx="1539190" cy="977385"/>
-        </a:xfrm>
-        <a:prstGeom prst="roundRect">
-          <a:avLst>
-            <a:gd name="adj" fmla="val 10000"/>
-          </a:avLst>
-        </a:prstGeom>
-        <a:solidFill>
-          <a:schemeClr val="lt1">
-            <a:alpha val="90000"/>
-            <a:hueOff val="0"/>
-            <a:satOff val="0"/>
-            <a:lumOff val="0"/>
-            <a:alphaOff val="0"/>
-          </a:schemeClr>
-        </a:solidFill>
-        <a:ln w="12700" cap="flat" cmpd="sng" algn="ctr">
-          <a:solidFill>
-            <a:schemeClr val="accent1">
-              <a:hueOff val="0"/>
-              <a:satOff val="0"/>
-              <a:lumOff val="0"/>
-              <a:alphaOff val="0"/>
-            </a:schemeClr>
-          </a:solidFill>
-          <a:prstDash val="solid"/>
-          <a:miter lim="800000"/>
-        </a:ln>
-        <a:effectLst/>
-      </dsp:spPr>
-      <dsp:style>
-        <a:lnRef idx="2">
-          <a:scrgbClr r="0" g="0" b="0"/>
-        </a:lnRef>
-        <a:fillRef idx="1">
-          <a:scrgbClr r="0" g="0" b="0"/>
-        </a:fillRef>
-        <a:effectRef idx="0">
-          <a:scrgbClr r="0" g="0" b="0"/>
-        </a:effectRef>
-        <a:fontRef idx="minor"/>
-      </dsp:style>
-      <dsp:txBody>
-        <a:bodyPr spcFirstLastPara="0" vert="horz" wrap="square" lIns="160020" tIns="160020" rIns="160020" bIns="160020" numCol="1" spcCol="1270" anchor="ctr" anchorCtr="0">
-          <a:noAutofit/>
-        </a:bodyPr>
-        <a:lstStyle/>
-        <a:p>
-          <a:pPr marL="0" lvl="0" indent="0" algn="ctr" defTabSz="1866900">
-            <a:lnSpc>
-              <a:spcPct val="90000"/>
-            </a:lnSpc>
-            <a:spcBef>
-              <a:spcPct val="0"/>
-            </a:spcBef>
-            <a:spcAft>
-              <a:spcPct val="35000"/>
-            </a:spcAft>
-            <a:buNone/>
-          </a:pPr>
-          <a:r>
-            <a:rPr lang="en-GB" sz="4200" kern="1200" dirty="0" err="1"/>
-            <a:t>PoP</a:t>
-          </a:r>
-          <a:endParaRPr lang="en-GB" sz="4200" kern="1200" dirty="0"/>
-        </a:p>
-      </dsp:txBody>
-      <dsp:txXfrm>
-        <a:off x="1589360" y="1618612"/>
-        <a:ext cx="1481936" cy="920131"/>
-      </dsp:txXfrm>
-    </dsp:sp>
-    <dsp:sp modelId="{148693FC-A487-8A4B-8BF4-6B4DD89A580F}">
-      <dsp:nvSpPr>
-        <dsp:cNvPr id="0" name=""/>
-        <dsp:cNvSpPr/>
-      </dsp:nvSpPr>
-      <dsp:spPr>
-        <a:xfrm>
-          <a:off x="449096" y="2852549"/>
-          <a:ext cx="1539190" cy="977385"/>
-        </a:xfrm>
-        <a:prstGeom prst="roundRect">
-          <a:avLst>
-            <a:gd name="adj" fmla="val 10000"/>
-          </a:avLst>
-        </a:prstGeom>
-        <a:solidFill>
-          <a:schemeClr val="accent1">
-            <a:hueOff val="0"/>
-            <a:satOff val="0"/>
-            <a:lumOff val="0"/>
-            <a:alphaOff val="0"/>
-          </a:schemeClr>
-        </a:solidFill>
-        <a:ln w="12700" cap="flat" cmpd="sng" algn="ctr">
-          <a:solidFill>
-            <a:schemeClr val="lt1">
-              <a:hueOff val="0"/>
-              <a:satOff val="0"/>
-              <a:lumOff val="0"/>
-              <a:alphaOff val="0"/>
-            </a:schemeClr>
-          </a:solidFill>
-          <a:prstDash val="solid"/>
-          <a:miter lim="800000"/>
-        </a:ln>
-        <a:effectLst/>
-      </dsp:spPr>
-      <dsp:style>
-        <a:lnRef idx="2">
-          <a:scrgbClr r="0" g="0" b="0"/>
-        </a:lnRef>
-        <a:fillRef idx="1">
-          <a:scrgbClr r="0" g="0" b="0"/>
-        </a:fillRef>
-        <a:effectRef idx="0">
-          <a:scrgbClr r="0" g="0" b="0"/>
-        </a:effectRef>
-        <a:fontRef idx="minor">
-          <a:schemeClr val="lt1"/>
-        </a:fontRef>
-      </dsp:style>
-    </dsp:sp>
-    <dsp:sp modelId="{A8F1EA25-BC50-474C-B3A2-AAE5024B4056}">
-      <dsp:nvSpPr>
-        <dsp:cNvPr id="0" name=""/>
-        <dsp:cNvSpPr/>
-      </dsp:nvSpPr>
-      <dsp:spPr>
-        <a:xfrm>
-          <a:off x="620117" y="3015019"/>
-          <a:ext cx="1539190" cy="977385"/>
-        </a:xfrm>
-        <a:prstGeom prst="roundRect">
-          <a:avLst>
-            <a:gd name="adj" fmla="val 10000"/>
-          </a:avLst>
-        </a:prstGeom>
-        <a:solidFill>
-          <a:schemeClr val="lt1">
-            <a:alpha val="90000"/>
-            <a:hueOff val="0"/>
-            <a:satOff val="0"/>
-            <a:lumOff val="0"/>
-            <a:alphaOff val="0"/>
-          </a:schemeClr>
-        </a:solidFill>
-        <a:ln w="12700" cap="flat" cmpd="sng" algn="ctr">
-          <a:solidFill>
-            <a:schemeClr val="accent1">
-              <a:hueOff val="0"/>
-              <a:satOff val="0"/>
-              <a:lumOff val="0"/>
-              <a:alphaOff val="0"/>
-            </a:schemeClr>
-          </a:solidFill>
-          <a:prstDash val="solid"/>
-          <a:miter lim="800000"/>
-        </a:ln>
-        <a:effectLst/>
-      </dsp:spPr>
-      <dsp:style>
-        <a:lnRef idx="2">
-          <a:scrgbClr r="0" g="0" b="0"/>
-        </a:lnRef>
-        <a:fillRef idx="1">
-          <a:scrgbClr r="0" g="0" b="0"/>
-        </a:fillRef>
-        <a:effectRef idx="0">
-          <a:scrgbClr r="0" g="0" b="0"/>
-        </a:effectRef>
-        <a:fontRef idx="minor"/>
-      </dsp:style>
-      <dsp:txBody>
-        <a:bodyPr spcFirstLastPara="0" vert="horz" wrap="square" lIns="160020" tIns="160020" rIns="160020" bIns="160020" numCol="1" spcCol="1270" anchor="ctr" anchorCtr="0">
-          <a:noAutofit/>
-        </a:bodyPr>
-        <a:lstStyle/>
-        <a:p>
-          <a:pPr marL="0" lvl="0" indent="0" algn="ctr" defTabSz="1866900">
-            <a:lnSpc>
-              <a:spcPct val="90000"/>
-            </a:lnSpc>
-            <a:spcBef>
-              <a:spcPct val="0"/>
-            </a:spcBef>
-            <a:spcAft>
-              <a:spcPct val="35000"/>
-            </a:spcAft>
-            <a:buNone/>
-          </a:pPr>
-          <a:r>
-            <a:rPr lang="en-GB" sz="4200" kern="1200" dirty="0"/>
-            <a:t>1g</a:t>
-          </a:r>
-        </a:p>
-      </dsp:txBody>
-      <dsp:txXfrm>
-        <a:off x="648744" y="3043646"/>
-        <a:ext cx="1481936" cy="920131"/>
-      </dsp:txXfrm>
-    </dsp:sp>
-    <dsp:sp modelId="{EA14BB45-A785-4144-9A19-278018D66CC7}">
-      <dsp:nvSpPr>
-        <dsp:cNvPr id="0" name=""/>
-        <dsp:cNvSpPr/>
-      </dsp:nvSpPr>
-      <dsp:spPr>
-        <a:xfrm>
-          <a:off x="2330328" y="2852549"/>
-          <a:ext cx="1539190" cy="977385"/>
-        </a:xfrm>
-        <a:prstGeom prst="roundRect">
-          <a:avLst>
-            <a:gd name="adj" fmla="val 10000"/>
-          </a:avLst>
-        </a:prstGeom>
-        <a:solidFill>
-          <a:schemeClr val="accent1">
-            <a:hueOff val="0"/>
-            <a:satOff val="0"/>
-            <a:lumOff val="0"/>
-            <a:alphaOff val="0"/>
-          </a:schemeClr>
-        </a:solidFill>
-        <a:ln w="12700" cap="flat" cmpd="sng" algn="ctr">
-          <a:solidFill>
-            <a:schemeClr val="lt1">
-              <a:hueOff val="0"/>
-              <a:satOff val="0"/>
-              <a:lumOff val="0"/>
-              <a:alphaOff val="0"/>
-            </a:schemeClr>
-          </a:solidFill>
-          <a:prstDash val="solid"/>
-          <a:miter lim="800000"/>
-        </a:ln>
-        <a:effectLst/>
-      </dsp:spPr>
-      <dsp:style>
-        <a:lnRef idx="2">
-          <a:scrgbClr r="0" g="0" b="0"/>
-        </a:lnRef>
-        <a:fillRef idx="1">
-          <a:scrgbClr r="0" g="0" b="0"/>
-        </a:fillRef>
-        <a:effectRef idx="0">
-          <a:scrgbClr r="0" g="0" b="0"/>
-        </a:effectRef>
-        <a:fontRef idx="minor">
-          <a:schemeClr val="lt1"/>
-        </a:fontRef>
-      </dsp:style>
-    </dsp:sp>
-    <dsp:sp modelId="{2A342ED3-E4AB-1C46-8103-202847B1289B}">
-      <dsp:nvSpPr>
-        <dsp:cNvPr id="0" name=""/>
-        <dsp:cNvSpPr/>
-      </dsp:nvSpPr>
-      <dsp:spPr>
-        <a:xfrm>
-          <a:off x="2501350" y="3015019"/>
-          <a:ext cx="1539190" cy="977385"/>
-        </a:xfrm>
-        <a:prstGeom prst="roundRect">
-          <a:avLst>
-            <a:gd name="adj" fmla="val 10000"/>
-          </a:avLst>
-        </a:prstGeom>
-        <a:solidFill>
-          <a:schemeClr val="lt1">
-            <a:alpha val="90000"/>
-            <a:hueOff val="0"/>
-            <a:satOff val="0"/>
-            <a:lumOff val="0"/>
-            <a:alphaOff val="0"/>
-          </a:schemeClr>
-        </a:solidFill>
-        <a:ln w="12700" cap="flat" cmpd="sng" algn="ctr">
-          <a:solidFill>
-            <a:schemeClr val="accent1">
-              <a:hueOff val="0"/>
-              <a:satOff val="0"/>
-              <a:lumOff val="0"/>
-              <a:alphaOff val="0"/>
-            </a:schemeClr>
-          </a:solidFill>
-          <a:prstDash val="solid"/>
-          <a:miter lim="800000"/>
-        </a:ln>
-        <a:effectLst/>
-      </dsp:spPr>
-      <dsp:style>
-        <a:lnRef idx="2">
-          <a:scrgbClr r="0" g="0" b="0"/>
-        </a:lnRef>
-        <a:fillRef idx="1">
-          <a:scrgbClr r="0" g="0" b="0"/>
-        </a:fillRef>
-        <a:effectRef idx="0">
-          <a:scrgbClr r="0" g="0" b="0"/>
-        </a:effectRef>
-        <a:fontRef idx="minor"/>
-      </dsp:style>
-      <dsp:txBody>
-        <a:bodyPr spcFirstLastPara="0" vert="horz" wrap="square" lIns="160020" tIns="160020" rIns="160020" bIns="160020" numCol="1" spcCol="1270" anchor="ctr" anchorCtr="0">
-          <a:noAutofit/>
-        </a:bodyPr>
-        <a:lstStyle/>
-        <a:p>
-          <a:pPr marL="0" lvl="0" indent="0" algn="ctr" defTabSz="1866900">
-            <a:lnSpc>
-              <a:spcPct val="90000"/>
-            </a:lnSpc>
-            <a:spcBef>
-              <a:spcPct val="0"/>
-            </a:spcBef>
-            <a:spcAft>
-              <a:spcPct val="35000"/>
-            </a:spcAft>
-            <a:buNone/>
-          </a:pPr>
-          <a:r>
-            <a:rPr lang="en-GB" sz="4200" kern="1200" dirty="0"/>
-            <a:t>2i</a:t>
-          </a:r>
-        </a:p>
-      </dsp:txBody>
-      <dsp:txXfrm>
-        <a:off x="2529977" y="3043646"/>
-        <a:ext cx="1481936" cy="920131"/>
-      </dsp:txXfrm>
-    </dsp:sp>
-    <dsp:sp modelId="{F1FE6B36-40B5-3046-8994-6623EA53D0E1}">
-      <dsp:nvSpPr>
-        <dsp:cNvPr id="0" name=""/>
-        <dsp:cNvSpPr/>
-      </dsp:nvSpPr>
-      <dsp:spPr>
-        <a:xfrm>
-          <a:off x="3270945" y="1427515"/>
-          <a:ext cx="1539190" cy="977385"/>
-        </a:xfrm>
-        <a:prstGeom prst="roundRect">
-          <a:avLst>
-            <a:gd name="adj" fmla="val 10000"/>
-          </a:avLst>
-        </a:prstGeom>
-        <a:solidFill>
-          <a:schemeClr val="accent1">
-            <a:hueOff val="0"/>
-            <a:satOff val="0"/>
-            <a:lumOff val="0"/>
-            <a:alphaOff val="0"/>
-          </a:schemeClr>
-        </a:solidFill>
-        <a:ln w="12700" cap="flat" cmpd="sng" algn="ctr">
-          <a:solidFill>
-            <a:schemeClr val="lt1">
-              <a:hueOff val="0"/>
-              <a:satOff val="0"/>
-              <a:lumOff val="0"/>
-              <a:alphaOff val="0"/>
-            </a:schemeClr>
-          </a:solidFill>
-          <a:prstDash val="solid"/>
-          <a:miter lim="800000"/>
-        </a:ln>
-        <a:effectLst/>
-      </dsp:spPr>
-      <dsp:style>
-        <a:lnRef idx="2">
-          <a:scrgbClr r="0" g="0" b="0"/>
-        </a:lnRef>
-        <a:fillRef idx="1">
-          <a:scrgbClr r="0" g="0" b="0"/>
-        </a:fillRef>
-        <a:effectRef idx="0">
-          <a:scrgbClr r="0" g="0" b="0"/>
-        </a:effectRef>
-        <a:fontRef idx="minor">
-          <a:schemeClr val="lt1"/>
-        </a:fontRef>
-      </dsp:style>
-    </dsp:sp>
-    <dsp:sp modelId="{17D60C5A-52BD-EE4B-B148-562261455075}">
-      <dsp:nvSpPr>
-        <dsp:cNvPr id="0" name=""/>
-        <dsp:cNvSpPr/>
-      </dsp:nvSpPr>
-      <dsp:spPr>
-        <a:xfrm>
-          <a:off x="3441966" y="1589985"/>
-          <a:ext cx="1539190" cy="977385"/>
-        </a:xfrm>
-        <a:prstGeom prst="roundRect">
-          <a:avLst>
-            <a:gd name="adj" fmla="val 10000"/>
-          </a:avLst>
-        </a:prstGeom>
-        <a:solidFill>
-          <a:schemeClr val="lt1">
-            <a:alpha val="90000"/>
-            <a:hueOff val="0"/>
-            <a:satOff val="0"/>
-            <a:lumOff val="0"/>
-            <a:alphaOff val="0"/>
-          </a:schemeClr>
-        </a:solidFill>
-        <a:ln w="12700" cap="flat" cmpd="sng" algn="ctr">
-          <a:solidFill>
-            <a:schemeClr val="accent1">
-              <a:hueOff val="0"/>
-              <a:satOff val="0"/>
-              <a:lumOff val="0"/>
-              <a:alphaOff val="0"/>
-            </a:schemeClr>
-          </a:solidFill>
-          <a:prstDash val="solid"/>
-          <a:miter lim="800000"/>
-        </a:ln>
-        <a:effectLst/>
-      </dsp:spPr>
-      <dsp:style>
-        <a:lnRef idx="2">
-          <a:scrgbClr r="0" g="0" b="0"/>
-        </a:lnRef>
-        <a:fillRef idx="1">
-          <a:scrgbClr r="0" g="0" b="0"/>
-        </a:fillRef>
-        <a:effectRef idx="0">
-          <a:scrgbClr r="0" g="0" b="0"/>
-        </a:effectRef>
-        <a:fontRef idx="minor"/>
-      </dsp:style>
-      <dsp:txBody>
-        <a:bodyPr spcFirstLastPara="0" vert="horz" wrap="square" lIns="160020" tIns="160020" rIns="160020" bIns="160020" numCol="1" spcCol="1270" anchor="ctr" anchorCtr="0">
-          <a:noAutofit/>
-        </a:bodyPr>
-        <a:lstStyle/>
-        <a:p>
-          <a:pPr marL="0" lvl="0" indent="0" algn="ctr" defTabSz="1866900">
-            <a:lnSpc>
-              <a:spcPct val="90000"/>
-            </a:lnSpc>
-            <a:spcBef>
-              <a:spcPct val="0"/>
-            </a:spcBef>
-            <a:spcAft>
-              <a:spcPct val="35000"/>
-            </a:spcAft>
-            <a:buNone/>
-          </a:pPr>
-          <a:r>
-            <a:rPr lang="en-GB" sz="4200" kern="1200" dirty="0"/>
-            <a:t>...</a:t>
-          </a:r>
-        </a:p>
-      </dsp:txBody>
-      <dsp:txXfrm>
-        <a:off x="3470593" y="1618612"/>
-        <a:ext cx="1481936" cy="920131"/>
-      </dsp:txXfrm>
-    </dsp:sp>
-  </dsp:spTree>
-</dsp:drawing>
-</file>
-
-<file path=ppt/diagrams/layout1.xml><?xml version="1.0" encoding="utf-8"?>
-<dgm:layoutDef xmlns:dgm="http://schemas.openxmlformats.org/drawingml/2006/diagram" xmlns:a="http://schemas.openxmlformats.org/drawingml/2006/main" uniqueId="urn:microsoft.com/office/officeart/2005/8/layout/hierarchy1">
-  <dgm:title val=""/>
-  <dgm:desc val=""/>
-  <dgm:catLst>
-    <dgm:cat type="hierarchy" pri="2000"/>
-  </dgm:catLst>
-  <dgm:sampData>
-    <dgm:dataModel>
-      <dgm:ptLst>
-        <dgm:pt modelId="0" type="doc"/>
-        <dgm:pt modelId="1">
-          <dgm:prSet phldr="1"/>
-        </dgm:pt>
-        <dgm:pt modelId="2">
-          <dgm:prSet phldr="1"/>
-        </dgm:pt>
-        <dgm:pt modelId="21">
-          <dgm:prSet phldr="1"/>
-        </dgm:pt>
-        <dgm:pt modelId="22">
-          <dgm:prSet phldr="1"/>
-        </dgm:pt>
-        <dgm:pt modelId="3">
-          <dgm:prSet phldr="1"/>
-        </dgm:pt>
-        <dgm:pt modelId="31">
-          <dgm:prSet phldr="1"/>
-        </dgm:pt>
-      </dgm:ptLst>
-      <dgm:cxnLst>
-        <dgm:cxn modelId="4" srcId="0" destId="1" srcOrd="0" destOrd="0"/>
-        <dgm:cxn modelId="5" srcId="1" destId="2" srcOrd="0" destOrd="0"/>
-        <dgm:cxn modelId="6" srcId="1" destId="3" srcOrd="1" destOrd="0"/>
-        <dgm:cxn modelId="23" srcId="2" destId="21" srcOrd="0" destOrd="0"/>
-        <dgm:cxn modelId="24" srcId="2" destId="22" srcOrd="1" destOrd="0"/>
-        <dgm:cxn modelId="33" srcId="3" destId="31" srcOrd="0" destOrd="0"/>
-      </dgm:cxnLst>
-      <dgm:bg/>
-      <dgm:whole/>
-    </dgm:dataModel>
-  </dgm:sampData>
-  <dgm:styleData>
-    <dgm:dataModel>
-      <dgm:ptLst>
-        <dgm:pt modelId="0" type="doc"/>
-        <dgm:pt modelId="1"/>
-        <dgm:pt modelId="11"/>
-        <dgm:pt modelId="12"/>
-      </dgm:ptLst>
-      <dgm:cxnLst>
-        <dgm:cxn modelId="2" srcId="0" destId="1" srcOrd="0" destOrd="0"/>
-        <dgm:cxn modelId="13" srcId="1" destId="11" srcOrd="0" destOrd="0"/>
-        <dgm:cxn modelId="14" srcId="1" destId="12" srcOrd="1" destOrd="0"/>
-      </dgm:cxnLst>
-      <dgm:bg/>
-      <dgm:whole/>
-    </dgm:dataModel>
-  </dgm:styleData>
-  <dgm:clrData>
-    <dgm:dataModel>
-      <dgm:ptLst>
-        <dgm:pt modelId="0" type="doc"/>
-        <dgm:pt modelId="1"/>
-        <dgm:pt modelId="2"/>
-        <dgm:pt modelId="21"/>
-        <dgm:pt modelId="211"/>
-        <dgm:pt modelId="3"/>
-        <dgm:pt modelId="31"/>
-        <dgm:pt modelId="311"/>
-      </dgm:ptLst>
-      <dgm:cxnLst>
-        <dgm:cxn modelId="4" srcId="0" destId="1" srcOrd="0" destOrd="0"/>
-        <dgm:cxn modelId="5" srcId="1" destId="2" srcOrd="0" destOrd="0"/>
-        <dgm:cxn modelId="6" srcId="1" destId="3" srcOrd="1" destOrd="0"/>
-        <dgm:cxn modelId="23" srcId="2" destId="21" srcOrd="0" destOrd="0"/>
-        <dgm:cxn modelId="24" srcId="21" destId="211" srcOrd="0" destOrd="0"/>
-        <dgm:cxn modelId="33" srcId="3" destId="31" srcOrd="0" destOrd="0"/>
-        <dgm:cxn modelId="34" srcId="31" destId="311" srcOrd="0" destOrd="0"/>
-      </dgm:cxnLst>
-      <dgm:bg/>
-      <dgm:whole/>
-    </dgm:dataModel>
-  </dgm:clrData>
-  <dgm:layoutNode name="hierChild1">
-    <dgm:varLst>
-      <dgm:chPref val="1"/>
-      <dgm:dir/>
-      <dgm:animOne val="branch"/>
-      <dgm:animLvl val="lvl"/>
-      <dgm:resizeHandles/>
-    </dgm:varLst>
-    <dgm:choose name="Name0">
-      <dgm:if name="Name1" func="var" arg="dir" op="equ" val="norm">
-        <dgm:alg type="hierChild">
-          <dgm:param type="linDir" val="fromL"/>
-        </dgm:alg>
-      </dgm:if>
-      <dgm:else name="Name2">
-        <dgm:alg type="hierChild">
-          <dgm:param type="linDir" val="fromR"/>
-        </dgm:alg>
-      </dgm:else>
-    </dgm:choose>
-    <dgm:shape xmlns:r="http://schemas.openxmlformats.org/officeDocument/2006/relationships" r:blip="">
-      <dgm:adjLst/>
-    </dgm:shape>
-    <dgm:presOf/>
-    <dgm:constrLst>
-      <dgm:constr type="primFontSz" for="des" ptType="node" op="equ" val="65"/>
-      <dgm:constr type="w" for="des" forName="composite" refType="w"/>
-      <dgm:constr type="h" for="des" forName="composite" refType="w" refFor="des" refForName="composite" fact="0.667"/>
-      <dgm:constr type="w" for="des" forName="composite2" refType="w" refFor="des" refForName="composite"/>
-      <dgm:constr type="h" for="des" forName="composite2" refType="h" refFor="des" refForName="composite"/>
-      <dgm:constr type="w" for="des" forName="composite3" refType="w" refFor="des" refForName="composite"/>
-      <dgm:constr type="h" for="des" forName="composite3" refType="h" refFor="des" refForName="composite"/>
-      <dgm:constr type="w" for="des" forName="composite4" refType="w" refFor="des" refForName="composite"/>
-      <dgm:constr type="h" for="des" forName="composite4" refType="h" refFor="des" refForName="composite"/>
-      <dgm:constr type="w" for="des" forName="composite5" refType="w" refFor="des" refForName="composite"/>
-      <dgm:constr type="h" for="des" forName="composite5" refType="h" refFor="des" refForName="composite"/>
-      <dgm:constr type="sibSp" refType="w" refFor="des" refForName="composite" fact="0.1"/>
-      <dgm:constr type="sibSp" for="des" forName="hierChild2" refType="sibSp"/>
-      <dgm:constr type="sibSp" for="des" forName="hierChild3" refType="sibSp"/>
-      <dgm:constr type="sibSp" for="des" forName="hierChild4" refType="sibSp"/>
-      <dgm:constr type="sibSp" for="des" forName="hierChild5" refType="sibSp"/>
-      <dgm:constr type="sibSp" for="des" forName="hierChild6" refType="sibSp"/>
-      <dgm:constr type="sp" for="des" forName="hierRoot1" refType="h" refFor="des" refForName="composite" fact="0.25"/>
-      <dgm:constr type="sp" for="des" forName="hierRoot2" refType="sp" refFor="des" refForName="hierRoot1"/>
-      <dgm:constr type="sp" for="des" forName="hierRoot3" refType="sp" refFor="des" refForName="hierRoot1"/>
-      <dgm:constr type="sp" for="des" forName="hierRoot4" refType="sp" refFor="des" refForName="hierRoot1"/>
-      <dgm:constr type="sp" for="des" forName="hierRoot5" refType="sp" refFor="des" refForName="hierRoot1"/>
-    </dgm:constrLst>
-    <dgm:ruleLst/>
-    <dgm:forEach name="Name3" axis="ch">
-      <dgm:forEach name="Name4" axis="self" ptType="node">
-        <dgm:layoutNode name="hierRoot1">
-          <dgm:alg type="hierRoot"/>
-          <dgm:shape xmlns:r="http://schemas.openxmlformats.org/officeDocument/2006/relationships" r:blip="">
-            <dgm:adjLst/>
-          </dgm:shape>
-          <dgm:presOf/>
-          <dgm:constrLst>
-            <dgm:constr type="bendDist" for="des" ptType="parTrans" refType="sp" fact="0.5"/>
-          </dgm:constrLst>
-          <dgm:ruleLst/>
-          <dgm:layoutNode name="composite">
-            <dgm:alg type="composite"/>
-            <dgm:shape xmlns:r="http://schemas.openxmlformats.org/officeDocument/2006/relationships" r:blip="">
-              <dgm:adjLst/>
-            </dgm:shape>
-            <dgm:presOf/>
-            <dgm:constrLst>
-              <dgm:constr type="w" for="ch" forName="background" refType="w" fact="0.9"/>
-              <dgm:constr type="h" for="ch" forName="background" refType="w" refFor="ch" refForName="background" fact="0.635"/>
-              <dgm:constr type="t" for="ch" forName="background"/>
-              <dgm:constr type="l" for="ch" forName="background"/>
-              <dgm:constr type="w" for="ch" forName="text" refType="w" fact="0.9"/>
-              <dgm:constr type="h" for="ch" forName="text" refType="w" refFor="ch" refForName="text" fact="0.635"/>
-              <dgm:constr type="t" for="ch" forName="text" refType="w" fact="0.095"/>
-              <dgm:constr type="l" for="ch" forName="text" refType="w" fact="0.1"/>
-            </dgm:constrLst>
-            <dgm:ruleLst/>
-            <dgm:layoutNode name="background" styleLbl="node0" moveWith="text">
-              <dgm:alg type="sp"/>
-              <dgm:shape xmlns:r="http://schemas.openxmlformats.org/officeDocument/2006/relationships" type="roundRect" r:blip="">
-                <dgm:adjLst>
-                  <dgm:adj idx="1" val="0.1"/>
-                </dgm:adjLst>
-              </dgm:shape>
-              <dgm:presOf/>
-              <dgm:constrLst/>
-              <dgm:ruleLst/>
-            </dgm:layoutNode>
-            <dgm:layoutNode name="text" styleLbl="fgAcc0">
-              <dgm:varLst>
-                <dgm:chPref val="3"/>
-              </dgm:varLst>
-              <dgm:alg type="tx"/>
-              <dgm:shape xmlns:r="http://schemas.openxmlformats.org/officeDocument/2006/relationships" type="roundRect" r:blip="">
-                <dgm:adjLst>
-                  <dgm:adj idx="1" val="0.1"/>
-                </dgm:adjLst>
-              </dgm:shape>
-              <dgm:presOf axis="self"/>
-              <dgm:constrLst>
-                <dgm:constr type="tMarg" refType="primFontSz" fact="0.3"/>
-                <dgm:constr type="bMarg" refType="primFontSz" fact="0.3"/>
-                <dgm:constr type="lMarg" refType="primFontSz" fact="0.3"/>
-                <dgm:constr type="rMarg" refType="primFontSz" fact="0.3"/>
-              </dgm:constrLst>
-              <dgm:ruleLst>
-                <dgm:rule type="primFontSz" val="5" fact="NaN" max="NaN"/>
-              </dgm:ruleLst>
-            </dgm:layoutNode>
-          </dgm:layoutNode>
-          <dgm:layoutNode name="hierChild2">
-            <dgm:choose name="Name5">
-              <dgm:if name="Name6" func="var" arg="dir" op="equ" val="norm">
-                <dgm:alg type="hierChild">
-                  <dgm:param type="linDir" val="fromL"/>
-                </dgm:alg>
-              </dgm:if>
-              <dgm:else name="Name7">
-                <dgm:alg type="hierChild">
-                  <dgm:param type="linDir" val="fromR"/>
-                </dgm:alg>
-              </dgm:else>
-            </dgm:choose>
-            <dgm:shape xmlns:r="http://schemas.openxmlformats.org/officeDocument/2006/relationships" r:blip="">
-              <dgm:adjLst/>
-            </dgm:shape>
-            <dgm:presOf/>
-            <dgm:constrLst/>
-            <dgm:ruleLst/>
-            <dgm:forEach name="Name8" axis="ch">
-              <dgm:forEach name="Name9" axis="self" ptType="parTrans" cnt="1">
-                <dgm:layoutNode name="Name10">
-                  <dgm:alg type="conn">
-                    <dgm:param type="dim" val="1D"/>
-                    <dgm:param type="endSty" val="noArr"/>
-                    <dgm:param type="connRout" val="bend"/>
-                    <dgm:param type="bendPt" val="end"/>
-                    <dgm:param type="begPts" val="bCtr"/>
-                    <dgm:param type="endPts" val="tCtr"/>
-                    <dgm:param type="srcNode" val="background"/>
-                    <dgm:param type="dstNode" val="background2"/>
-                  </dgm:alg>
-                  <dgm:shape xmlns:r="http://schemas.openxmlformats.org/officeDocument/2006/relationships" type="conn" r:blip="" zOrderOff="-999">
-                    <dgm:adjLst/>
-                  </dgm:shape>
-                  <dgm:presOf axis="self"/>
-                  <dgm:constrLst>
-                    <dgm:constr type="begPad"/>
-                    <dgm:constr type="endPad"/>
-                  </dgm:constrLst>
-                  <dgm:ruleLst/>
-                </dgm:layoutNode>
-              </dgm:forEach>
-              <dgm:forEach name="Name11" axis="self" ptType="node">
-                <dgm:layoutNode name="hierRoot2">
-                  <dgm:alg type="hierRoot"/>
-                  <dgm:shape xmlns:r="http://schemas.openxmlformats.org/officeDocument/2006/relationships" r:blip="">
-                    <dgm:adjLst/>
-                  </dgm:shape>
-                  <dgm:presOf/>
-                  <dgm:constrLst>
-                    <dgm:constr type="bendDist" for="des" ptType="parTrans" refType="sp" fact="0.5"/>
-                  </dgm:constrLst>
-                  <dgm:ruleLst/>
-                  <dgm:layoutNode name="composite2">
-                    <dgm:alg type="composite"/>
-                    <dgm:shape xmlns:r="http://schemas.openxmlformats.org/officeDocument/2006/relationships" r:blip="">
-                      <dgm:adjLst/>
-                    </dgm:shape>
-                    <dgm:presOf/>
-                    <dgm:constrLst>
-                      <dgm:constr type="w" for="ch" forName="background2" refType="w" fact="0.9"/>
-                      <dgm:constr type="h" for="ch" forName="background2" refType="w" refFor="ch" refForName="background2" fact="0.635"/>
-                      <dgm:constr type="t" for="ch" forName="background2"/>
-                      <dgm:constr type="l" for="ch" forName="background2"/>
-                      <dgm:constr type="w" for="ch" forName="text2" refType="w" fact="0.9"/>
-                      <dgm:constr type="h" for="ch" forName="text2" refType="w" refFor="ch" refForName="text2" fact="0.635"/>
-                      <dgm:constr type="t" for="ch" forName="text2" refType="w" fact="0.095"/>
-                      <dgm:constr type="l" for="ch" forName="text2" refType="w" fact="0.1"/>
-                    </dgm:constrLst>
-                    <dgm:ruleLst/>
-                    <dgm:layoutNode name="background2" moveWith="text2">
-                      <dgm:alg type="sp"/>
-                      <dgm:shape xmlns:r="http://schemas.openxmlformats.org/officeDocument/2006/relationships" type="roundRect" r:blip="">
-                        <dgm:adjLst>
-                          <dgm:adj idx="1" val="0.1"/>
-                        </dgm:adjLst>
-                      </dgm:shape>
-                      <dgm:presOf/>
-                      <dgm:constrLst/>
-                      <dgm:ruleLst/>
-                    </dgm:layoutNode>
-                    <dgm:layoutNode name="text2" styleLbl="fgAcc2">
-                      <dgm:varLst>
-                        <dgm:chPref val="3"/>
-                      </dgm:varLst>
-                      <dgm:alg type="tx"/>
-                      <dgm:shape xmlns:r="http://schemas.openxmlformats.org/officeDocument/2006/relationships" type="roundRect" r:blip="">
-                        <dgm:adjLst>
-                          <dgm:adj idx="1" val="0.1"/>
-                        </dgm:adjLst>
-                      </dgm:shape>
-                      <dgm:presOf axis="self"/>
-                      <dgm:constrLst>
-                        <dgm:constr type="tMarg" refType="primFontSz" fact="0.3"/>
-                        <dgm:constr type="bMarg" refType="primFontSz" fact="0.3"/>
-                        <dgm:constr type="lMarg" refType="primFontSz" fact="0.3"/>
-                        <dgm:constr type="rMarg" refType="primFontSz" fact="0.3"/>
-                      </dgm:constrLst>
-                      <dgm:ruleLst>
-                        <dgm:rule type="primFontSz" val="5" fact="NaN" max="NaN"/>
-                      </dgm:ruleLst>
-                    </dgm:layoutNode>
-                  </dgm:layoutNode>
-                  <dgm:layoutNode name="hierChild3">
-                    <dgm:choose name="Name12">
-                      <dgm:if name="Name13" func="var" arg="dir" op="equ" val="norm">
-                        <dgm:alg type="hierChild">
-                          <dgm:param type="linDir" val="fromL"/>
-                        </dgm:alg>
-                      </dgm:if>
-                      <dgm:else name="Name14">
-                        <dgm:alg type="hierChild">
-                          <dgm:param type="linDir" val="fromR"/>
-                        </dgm:alg>
-                      </dgm:else>
-                    </dgm:choose>
-                    <dgm:shape xmlns:r="http://schemas.openxmlformats.org/officeDocument/2006/relationships" r:blip="">
-                      <dgm:adjLst/>
-                    </dgm:shape>
-                    <dgm:presOf/>
-                    <dgm:constrLst/>
-                    <dgm:ruleLst/>
-                    <dgm:forEach name="Name15" axis="ch">
-                      <dgm:forEach name="Name16" axis="self" ptType="parTrans" cnt="1">
-                        <dgm:layoutNode name="Name17">
-                          <dgm:alg type="conn">
-                            <dgm:param type="dim" val="1D"/>
-                            <dgm:param type="endSty" val="noArr"/>
-                            <dgm:param type="connRout" val="bend"/>
-                            <dgm:param type="bendPt" val="end"/>
-                            <dgm:param type="begPts" val="bCtr"/>
-                            <dgm:param type="endPts" val="tCtr"/>
-                            <dgm:param type="srcNode" val="background2"/>
-                            <dgm:param type="dstNode" val="background3"/>
-                          </dgm:alg>
-                          <dgm:shape xmlns:r="http://schemas.openxmlformats.org/officeDocument/2006/relationships" type="conn" r:blip="" zOrderOff="-999">
-                            <dgm:adjLst/>
-                          </dgm:shape>
-                          <dgm:presOf axis="self"/>
-                          <dgm:constrLst>
-                            <dgm:constr type="begPad"/>
-                            <dgm:constr type="endPad"/>
-                          </dgm:constrLst>
-                          <dgm:ruleLst/>
-                        </dgm:layoutNode>
-                      </dgm:forEach>
-                      <dgm:forEach name="Name18" axis="self" ptType="node">
-                        <dgm:layoutNode name="hierRoot3">
-                          <dgm:alg type="hierRoot"/>
-                          <dgm:shape xmlns:r="http://schemas.openxmlformats.org/officeDocument/2006/relationships" r:blip="">
-                            <dgm:adjLst/>
-                          </dgm:shape>
-                          <dgm:presOf/>
-                          <dgm:constrLst>
-                            <dgm:constr type="bendDist" for="des" ptType="parTrans" refType="sp" fact="0.5"/>
-                          </dgm:constrLst>
-                          <dgm:ruleLst/>
-                          <dgm:layoutNode name="composite3">
-                            <dgm:alg type="composite"/>
-                            <dgm:shape xmlns:r="http://schemas.openxmlformats.org/officeDocument/2006/relationships" r:blip="">
-                              <dgm:adjLst/>
-                            </dgm:shape>
-                            <dgm:presOf/>
-                            <dgm:constrLst>
-                              <dgm:constr type="w" for="ch" forName="background3" refType="w" fact="0.9"/>
-                              <dgm:constr type="h" for="ch" forName="background3" refType="w" refFor="ch" refForName="background3" fact="0.635"/>
-                              <dgm:constr type="t" for="ch" forName="background3"/>
-                              <dgm:constr type="l" for="ch" forName="background3"/>
-                              <dgm:constr type="w" for="ch" forName="text3" refType="w" fact="0.9"/>
-                              <dgm:constr type="h" for="ch" forName="text3" refType="w" refFor="ch" refForName="text3" fact="0.635"/>
-                              <dgm:constr type="t" for="ch" forName="text3" refType="w" fact="0.095"/>
-                              <dgm:constr type="l" for="ch" forName="text3" refType="w" fact="0.1"/>
-                            </dgm:constrLst>
-                            <dgm:ruleLst/>
-                            <dgm:layoutNode name="background3" moveWith="text3">
-                              <dgm:alg type="sp"/>
-                              <dgm:shape xmlns:r="http://schemas.openxmlformats.org/officeDocument/2006/relationships" type="roundRect" r:blip="">
-                                <dgm:adjLst>
-                                  <dgm:adj idx="1" val="0.1"/>
-                                </dgm:adjLst>
-                              </dgm:shape>
-                              <dgm:presOf/>
-                              <dgm:constrLst/>
-                              <dgm:ruleLst/>
-                            </dgm:layoutNode>
-                            <dgm:layoutNode name="text3" styleLbl="fgAcc3">
-                              <dgm:varLst>
-                                <dgm:chPref val="3"/>
-                              </dgm:varLst>
-                              <dgm:alg type="tx"/>
-                              <dgm:shape xmlns:r="http://schemas.openxmlformats.org/officeDocument/2006/relationships" type="roundRect" r:blip="">
-                                <dgm:adjLst>
-                                  <dgm:adj idx="1" val="0.1"/>
-                                </dgm:adjLst>
-                              </dgm:shape>
-                              <dgm:presOf axis="self"/>
-                              <dgm:constrLst>
-                                <dgm:constr type="tMarg" refType="primFontSz" fact="0.3"/>
-                                <dgm:constr type="bMarg" refType="primFontSz" fact="0.3"/>
-                                <dgm:constr type="lMarg" refType="primFontSz" fact="0.3"/>
-                                <dgm:constr type="rMarg" refType="primFontSz" fact="0.3"/>
-                              </dgm:constrLst>
-                              <dgm:ruleLst>
-                                <dgm:rule type="primFontSz" val="5" fact="NaN" max="NaN"/>
-                              </dgm:ruleLst>
-                            </dgm:layoutNode>
-                          </dgm:layoutNode>
-                          <dgm:layoutNode name="hierChild4">
-                            <dgm:choose name="Name19">
-                              <dgm:if name="Name20" func="var" arg="dir" op="equ" val="norm">
-                                <dgm:alg type="hierChild">
-                                  <dgm:param type="linDir" val="fromL"/>
-                                </dgm:alg>
-                              </dgm:if>
-                              <dgm:else name="Name21">
-                                <dgm:alg type="hierChild">
-                                  <dgm:param type="linDir" val="fromR"/>
-                                </dgm:alg>
-                              </dgm:else>
-                            </dgm:choose>
-                            <dgm:shape xmlns:r="http://schemas.openxmlformats.org/officeDocument/2006/relationships" r:blip="">
-                              <dgm:adjLst/>
-                            </dgm:shape>
-                            <dgm:presOf/>
-                            <dgm:constrLst/>
-                            <dgm:ruleLst/>
-                            <dgm:forEach name="repeat" axis="ch">
-                              <dgm:forEach name="Name22" axis="self" ptType="parTrans" cnt="1">
-                                <dgm:layoutNode name="Name23">
-                                  <dgm:choose name="Name24">
-                                    <dgm:if name="Name25" axis="self" func="depth" op="lte" val="4">
-                                      <dgm:alg type="conn">
-                                        <dgm:param type="dim" val="1D"/>
-                                        <dgm:param type="endSty" val="noArr"/>
-                                        <dgm:param type="connRout" val="bend"/>
-                                        <dgm:param type="bendPt" val="end"/>
-                                        <dgm:param type="begPts" val="bCtr"/>
-                                        <dgm:param type="endPts" val="tCtr"/>
-                                        <dgm:param type="srcNode" val="background3"/>
-                                        <dgm:param type="dstNode" val="background4"/>
-                                      </dgm:alg>
-                                    </dgm:if>
-                                    <dgm:else name="Name26">
-                                      <dgm:alg type="conn">
-                                        <dgm:param type="dim" val="1D"/>
-                                        <dgm:param type="endSty" val="noArr"/>
-                                        <dgm:param type="connRout" val="bend"/>
-                                        <dgm:param type="bendPt" val="end"/>
-                                        <dgm:param type="begPts" val="bCtr"/>
-                                        <dgm:param type="endPts" val="tCtr"/>
-                                        <dgm:param type="srcNode" val="background4"/>
-                                        <dgm:param type="dstNode" val="background4"/>
-                                      </dgm:alg>
-                                    </dgm:else>
-                                  </dgm:choose>
-                                  <dgm:shape xmlns:r="http://schemas.openxmlformats.org/officeDocument/2006/relationships" type="conn" r:blip="" zOrderOff="-999">
-                                    <dgm:adjLst/>
-                                  </dgm:shape>
-                                  <dgm:presOf axis="self"/>
-                                  <dgm:constrLst>
-                                    <dgm:constr type="begPad"/>
-                                    <dgm:constr type="endPad"/>
-                                  </dgm:constrLst>
-                                  <dgm:ruleLst/>
-                                </dgm:layoutNode>
-                              </dgm:forEach>
-                              <dgm:forEach name="Name27" axis="self" ptType="node">
-                                <dgm:layoutNode name="hierRoot4">
-                                  <dgm:alg type="hierRoot"/>
-                                  <dgm:shape xmlns:r="http://schemas.openxmlformats.org/officeDocument/2006/relationships" r:blip="">
-                                    <dgm:adjLst/>
-                                  </dgm:shape>
-                                  <dgm:presOf/>
-                                  <dgm:constrLst>
-                                    <dgm:constr type="bendDist" for="des" ptType="parTrans" refType="sp" fact="0.5"/>
-                                  </dgm:constrLst>
-                                  <dgm:ruleLst/>
-                                  <dgm:layoutNode name="composite4">
-                                    <dgm:alg type="composite"/>
-                                    <dgm:shape xmlns:r="http://schemas.openxmlformats.org/officeDocument/2006/relationships" r:blip="">
-                                      <dgm:adjLst/>
-                                    </dgm:shape>
-                                    <dgm:presOf/>
-                                    <dgm:constrLst>
-                                      <dgm:constr type="w" for="ch" forName="background4" refType="w" fact="0.9"/>
-                                      <dgm:constr type="h" for="ch" forName="background4" refType="w" refFor="ch" refForName="background4" fact="0.635"/>
-                                      <dgm:constr type="t" for="ch" forName="background4"/>
-                                      <dgm:constr type="l" for="ch" forName="background4"/>
-                                      <dgm:constr type="w" for="ch" forName="text4" refType="w" fact="0.9"/>
-                                      <dgm:constr type="h" for="ch" forName="text4" refType="w" refFor="ch" refForName="text4" fact="0.635"/>
-                                      <dgm:constr type="t" for="ch" forName="text4" refType="w" fact="0.095"/>
-                                      <dgm:constr type="l" for="ch" forName="text4" refType="w" fact="0.1"/>
-                                    </dgm:constrLst>
-                                    <dgm:ruleLst/>
-                                    <dgm:layoutNode name="background4" moveWith="text4">
-                                      <dgm:alg type="sp"/>
-                                      <dgm:shape xmlns:r="http://schemas.openxmlformats.org/officeDocument/2006/relationships" type="roundRect" r:blip="">
-                                        <dgm:adjLst>
-                                          <dgm:adj idx="1" val="0.1"/>
-                                        </dgm:adjLst>
-                                      </dgm:shape>
-                                      <dgm:presOf/>
-                                      <dgm:constrLst/>
-                                      <dgm:ruleLst/>
-                                    </dgm:layoutNode>
-                                    <dgm:layoutNode name="text4" styleLbl="fgAcc4">
-                                      <dgm:varLst>
-                                        <dgm:chPref val="3"/>
-                                      </dgm:varLst>
-                                      <dgm:alg type="tx"/>
-                                      <dgm:shape xmlns:r="http://schemas.openxmlformats.org/officeDocument/2006/relationships" type="roundRect" r:blip="">
-                                        <dgm:adjLst>
-                                          <dgm:adj idx="1" val="0.1"/>
-                                        </dgm:adjLst>
-                                      </dgm:shape>
-                                      <dgm:presOf axis="self"/>
-                                      <dgm:constrLst>
-                                        <dgm:constr type="tMarg" refType="primFontSz" fact="0.3"/>
-                                        <dgm:constr type="bMarg" refType="primFontSz" fact="0.3"/>
-                                        <dgm:constr type="lMarg" refType="primFontSz" fact="0.3"/>
-                                        <dgm:constr type="rMarg" refType="primFontSz" fact="0.3"/>
-                                      </dgm:constrLst>
-                                      <dgm:ruleLst>
-                                        <dgm:rule type="primFontSz" val="5" fact="NaN" max="NaN"/>
-                                      </dgm:ruleLst>
-                                    </dgm:layoutNode>
-                                  </dgm:layoutNode>
-                                  <dgm:layoutNode name="hierChild5">
-                                    <dgm:choose name="Name28">
-                                      <dgm:if name="Name29" func="var" arg="dir" op="equ" val="norm">
-                                        <dgm:alg type="hierChild">
-                                          <dgm:param type="linDir" val="fromL"/>
-                                        </dgm:alg>
-                                      </dgm:if>
-                                      <dgm:else name="Name30">
-                                        <dgm:alg type="hierChild">
-                                          <dgm:param type="linDir" val="fromR"/>
-                                        </dgm:alg>
-                                      </dgm:else>
-                                    </dgm:choose>
-                                    <dgm:shape xmlns:r="http://schemas.openxmlformats.org/officeDocument/2006/relationships" r:blip="">
-                                      <dgm:adjLst/>
-                                    </dgm:shape>
-                                    <dgm:presOf/>
-                                    <dgm:constrLst/>
-                                    <dgm:ruleLst/>
-                                    <dgm:forEach name="Name31" ref="repeat"/>
-                                  </dgm:layoutNode>
-                                </dgm:layoutNode>
-                              </dgm:forEach>
-                            </dgm:forEach>
-                          </dgm:layoutNode>
-                        </dgm:layoutNode>
-                      </dgm:forEach>
-                    </dgm:forEach>
-                  </dgm:layoutNode>
-                </dgm:layoutNode>
-              </dgm:forEach>
-            </dgm:forEach>
-          </dgm:layoutNode>
-        </dgm:layoutNode>
-      </dgm:forEach>
-    </dgm:forEach>
-  </dgm:layoutNode>
-</dgm:layoutDef>
-</file>
-
-<file path=ppt/diagrams/quickStyle1.xml><?xml version="1.0" encoding="utf-8"?>
-<dgm:styleDef xmlns:dgm="http://schemas.openxmlformats.org/drawingml/2006/diagram" xmlns:a="http://schemas.openxmlformats.org/drawingml/2006/main" uniqueId="urn:microsoft.com/office/officeart/2005/8/quickstyle/simple1">
-  <dgm:title val=""/>
-  <dgm:desc val=""/>
-  <dgm:catLst>
-    <dgm:cat type="simple" pri="10100"/>
-  </dgm:catLst>
-  <dgm:scene3d>
-    <a:camera prst="orthographicFront"/>
-    <a:lightRig rig="threePt" dir="t"/>
-  </dgm:scene3d>
-  <dgm:styleLbl name="node0">
-    <dgm:scene3d>
-      <a:camera prst="orthographicFront"/>
-      <a:lightRig rig="threePt" dir="t"/>
-    </dgm:scene3d>
-    <dgm:sp3d/>
-    <dgm:txPr/>
-    <dgm:style>
-      <a:lnRef idx="2">
-        <a:scrgbClr r="0" g="0" b="0"/>
-      </a:lnRef>
-      <a:fillRef idx="1">
-        <a:scrgbClr r="0" g="0" b="0"/>
-      </a:fillRef>
-      <a:effectRef idx="0">
-        <a:scrgbClr r="0" g="0" b="0"/>
-      </a:effectRef>
-      <a:fontRef idx="minor">
-        <a:schemeClr val="lt1"/>
-      </a:fontRef>
-    </dgm:style>
-  </dgm:styleLbl>
-  <dgm:styleLbl name="lnNode1">
-    <dgm:scene3d>
-      <a:camera prst="orthographicFront"/>
-      <a:lightRig rig="threePt" dir="t"/>
-    </dgm:scene3d>
-    <dgm:sp3d/>
-    <dgm:txPr/>
-    <dgm:style>
-      <a:lnRef idx="2">
-        <a:scrgbClr r="0" g="0" b="0"/>
-      </a:lnRef>
-      <a:fillRef idx="1">
-        <a:scrgbClr r="0" g="0" b="0"/>
-      </a:fillRef>
-      <a:effectRef idx="0">
-        <a:scrgbClr r="0" g="0" b="0"/>
-      </a:effectRef>
-      <a:fontRef idx="minor">
-        <a:schemeClr val="lt1"/>
-      </a:fontRef>
-    </dgm:style>
-  </dgm:styleLbl>
-  <dgm:styleLbl name="vennNode1">
-    <dgm:scene3d>
-      <a:camera prst="orthographicFront"/>
-      <a:lightRig rig="threePt" dir="t"/>
-    </dgm:scene3d>
-    <dgm:sp3d/>
-    <dgm:txPr/>
-    <dgm:style>
-      <a:lnRef idx="2">
-        <a:scrgbClr r="0" g="0" b="0"/>
-      </a:lnRef>
-      <a:fillRef idx="1">
-        <a:scrgbClr r="0" g="0" b="0"/>
-      </a:fillRef>
-      <a:effectRef idx="0">
-        <a:scrgbClr r="0" g="0" b="0"/>
-      </a:effectRef>
-      <a:fontRef idx="minor">
-        <a:schemeClr val="tx1"/>
-      </a:fontRef>
-    </dgm:style>
-  </dgm:styleLbl>
-  <dgm:styleLbl name="alignNode1">
-    <dgm:scene3d>
-      <a:camera prst="orthographicFront"/>
-      <a:lightRig rig="threePt" dir="t"/>
-    </dgm:scene3d>
-    <dgm:sp3d/>
-    <dgm:txPr/>
-    <dgm:style>
-      <a:lnRef idx="2">
-        <a:scrgbClr r="0" g="0" b="0"/>
-      </a:lnRef>
-      <a:fillRef idx="1">
-        <a:scrgbClr r="0" g="0" b="0"/>
-      </a:fillRef>
-      <a:effectRef idx="0">
-        <a:scrgbClr r="0" g="0" b="0"/>
-      </a:effectRef>
-      <a:fontRef idx="minor">
-        <a:schemeClr val="lt1"/>
-      </a:fontRef>
-    </dgm:style>
-  </dgm:styleLbl>
-  <dgm:styleLbl name="node1">
-    <dgm:scene3d>
-      <a:camera prst="orthographicFront"/>
-      <a:lightRig rig="threePt" dir="t"/>
-    </dgm:scene3d>
-    <dgm:sp3d/>
-    <dgm:txPr/>
-    <dgm:style>
-      <a:lnRef idx="2">
-        <a:scrgbClr r="0" g="0" b="0"/>
-      </a:lnRef>
-      <a:fillRef idx="1">
-        <a:scrgbClr r="0" g="0" b="0"/>
-      </a:fillRef>
-      <a:effectRef idx="0">
-        <a:scrgbClr r="0" g="0" b="0"/>
-      </a:effectRef>
-      <a:fontRef idx="minor">
-        <a:schemeClr val="lt1"/>
-      </a:fontRef>
-    </dgm:style>
-  </dgm:styleLbl>
-  <dgm:styleLbl name="node2">
-    <dgm:scene3d>
-      <a:camera prst="orthographicFront"/>
-      <a:lightRig rig="threePt" dir="t"/>
-    </dgm:scene3d>
-    <dgm:sp3d/>
-    <dgm:txPr/>
-    <dgm:style>
-      <a:lnRef idx="2">
-        <a:scrgbClr r="0" g="0" b="0"/>
-      </a:lnRef>
-      <a:fillRef idx="1">
-        <a:scrgbClr r="0" g="0" b="0"/>
-      </a:fillRef>
-      <a:effectRef idx="0">
-        <a:scrgbClr r="0" g="0" b="0"/>
-      </a:effectRef>
-      <a:fontRef idx="minor">
-        <a:schemeClr val="lt1"/>
-      </a:fontRef>
-    </dgm:style>
-  </dgm:styleLbl>
-  <dgm:styleLbl name="node3">
-    <dgm:scene3d>
-      <a:camera prst="orthographicFront"/>
-      <a:lightRig rig="threePt" dir="t"/>
-    </dgm:scene3d>
-    <dgm:sp3d/>
-    <dgm:txPr/>
-    <dgm:style>
-      <a:lnRef idx="2">
-        <a:scrgbClr r="0" g="0" b="0"/>
-      </a:lnRef>
-      <a:fillRef idx="1">
-        <a:scrgbClr r="0" g="0" b="0"/>
-      </a:fillRef>
-      <a:effectRef idx="0">
-        <a:scrgbClr r="0" g="0" b="0"/>
-      </a:effectRef>
-      <a:fontRef idx="minor">
-        <a:schemeClr val="lt1"/>
-      </a:fontRef>
-    </dgm:style>
-  </dgm:styleLbl>
-  <dgm:styleLbl name="node4">
-    <dgm:scene3d>
-      <a:camera prst="orthographicFront"/>
-      <a:lightRig rig="threePt" dir="t"/>
-    </dgm:scene3d>
-    <dgm:sp3d/>
-    <dgm:txPr/>
-    <dgm:style>
-      <a:lnRef idx="2">
-        <a:scrgbClr r="0" g="0" b="0"/>
-      </a:lnRef>
-      <a:fillRef idx="1">
-        <a:scrgbClr r="0" g="0" b="0"/>
-      </a:fillRef>
-      <a:effectRef idx="0">
-        <a:scrgbClr r="0" g="0" b="0"/>
-      </a:effectRef>
-      <a:fontRef idx="minor">
-        <a:schemeClr val="lt1"/>
-      </a:fontRef>
-    </dgm:style>
-  </dgm:styleLbl>
-  <dgm:styleLbl name="fgImgPlace1">
-    <dgm:scene3d>
-      <a:camera prst="orthographicFront"/>
-      <a:lightRig rig="threePt" dir="t"/>
-    </dgm:scene3d>
-    <dgm:sp3d/>
-    <dgm:txPr/>
-    <dgm:style>
-      <a:lnRef idx="2">
-        <a:scrgbClr r="0" g="0" b="0"/>
-      </a:lnRef>
-      <a:fillRef idx="1">
-        <a:scrgbClr r="0" g="0" b="0"/>
-      </a:fillRef>
-      <a:effectRef idx="0">
-        <a:scrgbClr r="0" g="0" b="0"/>
-      </a:effectRef>
-      <a:fontRef idx="minor"/>
-    </dgm:style>
-  </dgm:styleLbl>
-  <dgm:styleLbl name="alignImgPlace1">
-    <dgm:scene3d>
-      <a:camera prst="orthographicFront"/>
-      <a:lightRig rig="threePt" dir="t"/>
-    </dgm:scene3d>
-    <dgm:sp3d/>
-    <dgm:txPr/>
-    <dgm:style>
-      <a:lnRef idx="2">
-        <a:scrgbClr r="0" g="0" b="0"/>
-      </a:lnRef>
-      <a:fillRef idx="1">
-        <a:scrgbClr r="0" g="0" b="0"/>
-      </a:fillRef>
-      <a:effectRef idx="0">
-        <a:scrgbClr r="0" g="0" b="0"/>
-      </a:effectRef>
-      <a:fontRef idx="minor"/>
-    </dgm:style>
-  </dgm:styleLbl>
-  <dgm:styleLbl name="bgImgPlace1">
-    <dgm:scene3d>
-      <a:camera prst="orthographicFront"/>
-      <a:lightRig rig="threePt" dir="t"/>
-    </dgm:scene3d>
-    <dgm:sp3d/>
-    <dgm:txPr/>
-    <dgm:style>
-      <a:lnRef idx="2">
-        <a:scrgbClr r="0" g="0" b="0"/>
-      </a:lnRef>
-      <a:fillRef idx="1">
-        <a:scrgbClr r="0" g="0" b="0"/>
-      </a:fillRef>
-      <a:effectRef idx="0">
-        <a:scrgbClr r="0" g="0" b="0"/>
-      </a:effectRef>
-      <a:fontRef idx="minor"/>
-    </dgm:style>
-  </dgm:styleLbl>
-  <dgm:styleLbl name="sibTrans2D1">
-    <dgm:scene3d>
-      <a:camera prst="orthographicFront"/>
-      <a:lightRig rig="threePt" dir="t"/>
-    </dgm:scene3d>
-    <dgm:sp3d/>
-    <dgm:txPr/>
-    <dgm:style>
-      <a:lnRef idx="0">
-        <a:scrgbClr r="0" g="0" b="0"/>
-      </a:lnRef>
-      <a:fillRef idx="1">
-        <a:scrgbClr r="0" g="0" b="0"/>
-      </a:fillRef>
-      <a:effectRef idx="0">
-        <a:scrgbClr r="0" g="0" b="0"/>
-      </a:effectRef>
-      <a:fontRef idx="minor">
-        <a:schemeClr val="lt1"/>
-      </a:fontRef>
-    </dgm:style>
-  </dgm:styleLbl>
-  <dgm:styleLbl name="fgSibTrans2D1">
-    <dgm:scene3d>
-      <a:camera prst="orthographicFront"/>
-      <a:lightRig rig="threePt" dir="t"/>
-    </dgm:scene3d>
-    <dgm:sp3d/>
-    <dgm:txPr/>
-    <dgm:style>
-      <a:lnRef idx="0">
-        <a:scrgbClr r="0" g="0" b="0"/>
-      </a:lnRef>
-      <a:fillRef idx="1">
-        <a:scrgbClr r="0" g="0" b="0"/>
-      </a:fillRef>
-      <a:effectRef idx="0">
-        <a:scrgbClr r="0" g="0" b="0"/>
-      </a:effectRef>
-      <a:fontRef idx="minor">
-        <a:schemeClr val="lt1"/>
-      </a:fontRef>
-    </dgm:style>
-  </dgm:styleLbl>
-  <dgm:styleLbl name="bgSibTrans2D1">
-    <dgm:scene3d>
-      <a:camera prst="orthographicFront"/>
-      <a:lightRig rig="threePt" dir="t"/>
-    </dgm:scene3d>
-    <dgm:sp3d/>
-    <dgm:txPr/>
-    <dgm:style>
-      <a:lnRef idx="0">
-        <a:scrgbClr r="0" g="0" b="0"/>
-      </a:lnRef>
-      <a:fillRef idx="1">
-        <a:scrgbClr r="0" g="0" b="0"/>
-      </a:fillRef>
-      <a:effectRef idx="0">
-        <a:scrgbClr r="0" g="0" b="0"/>
-      </a:effectRef>
-      <a:fontRef idx="minor">
-        <a:schemeClr val="lt1"/>
-      </a:fontRef>
-    </dgm:style>
-  </dgm:styleLbl>
-  <dgm:styleLbl name="sibTrans1D1">
-    <dgm:scene3d>
-      <a:camera prst="orthographicFront"/>
-      <a:lightRig rig="threePt" dir="t"/>
-    </dgm:scene3d>
-    <dgm:sp3d/>
-    <dgm:txPr/>
-    <dgm:style>
-      <a:lnRef idx="1">
-        <a:scrgbClr r="0" g="0" b="0"/>
-      </a:lnRef>
-      <a:fillRef idx="0">
-        <a:scrgbClr r="0" g="0" b="0"/>
-      </a:fillRef>
-      <a:effectRef idx="0">
-        <a:scrgbClr r="0" g="0" b="0"/>
-      </a:effectRef>
-      <a:fontRef idx="minor"/>
-    </dgm:style>
-  </dgm:styleLbl>
-  <dgm:styleLbl name="callout">
-    <dgm:scene3d>
-      <a:camera prst="orthographicFront"/>
-      <a:lightRig rig="threePt" dir="t"/>
-    </dgm:scene3d>
-    <dgm:sp3d/>
-    <dgm:txPr/>
-    <dgm:style>
-      <a:lnRef idx="2">
-        <a:scrgbClr r="0" g="0" b="0"/>
-      </a:lnRef>
-      <a:fillRef idx="1">
-        <a:scrgbClr r="0" g="0" b="0"/>
-      </a:fillRef>
-      <a:effectRef idx="0">
-        <a:scrgbClr r="0" g="0" b="0"/>
-      </a:effectRef>
-      <a:fontRef idx="minor"/>
-    </dgm:style>
-  </dgm:styleLbl>
-  <dgm:styleLbl name="asst0">
-    <dgm:scene3d>
-      <a:camera prst="orthographicFront"/>
-      <a:lightRig rig="threePt" dir="t"/>
-    </dgm:scene3d>
-    <dgm:sp3d/>
-    <dgm:txPr/>
-    <dgm:style>
-      <a:lnRef idx="2">
-        <a:scrgbClr r="0" g="0" b="0"/>
-      </a:lnRef>
-      <a:fillRef idx="1">
-        <a:scrgbClr r="0" g="0" b="0"/>
-      </a:fillRef>
-      <a:effectRef idx="0">
-        <a:scrgbClr r="0" g="0" b="0"/>
-      </a:effectRef>
-      <a:fontRef idx="minor">
-        <a:schemeClr val="lt1"/>
-      </a:fontRef>
-    </dgm:style>
-  </dgm:styleLbl>
-  <dgm:styleLbl name="asst1">
-    <dgm:scene3d>
-      <a:camera prst="orthographicFront"/>
-      <a:lightRig rig="threePt" dir="t"/>
-    </dgm:scene3d>
-    <dgm:sp3d/>
-    <dgm:txPr/>
-    <dgm:style>
-      <a:lnRef idx="2">
-        <a:scrgbClr r="0" g="0" b="0"/>
-      </a:lnRef>
-      <a:fillRef idx="1">
-        <a:scrgbClr r="0" g="0" b="0"/>
-      </a:fillRef>
-      <a:effectRef idx="0">
-        <a:scrgbClr r="0" g="0" b="0"/>
-      </a:effectRef>
-      <a:fontRef idx="minor">
-        <a:schemeClr val="lt1"/>
-      </a:fontRef>
-    </dgm:style>
-  </dgm:styleLbl>
-  <dgm:styleLbl name="asst2">
-    <dgm:scene3d>
-      <a:camera prst="orthographicFront"/>
-      <a:lightRig rig="threePt" dir="t"/>
-    </dgm:scene3d>
-    <dgm:sp3d/>
-    <dgm:txPr/>
-    <dgm:style>
-      <a:lnRef idx="2">
-        <a:scrgbClr r="0" g="0" b="0"/>
-      </a:lnRef>
-      <a:fillRef idx="1">
-        <a:scrgbClr r="0" g="0" b="0"/>
-      </a:fillRef>
-      <a:effectRef idx="0">
-        <a:scrgbClr r="0" g="0" b="0"/>
-      </a:effectRef>
-      <a:fontRef idx="minor">
-        <a:schemeClr val="lt1"/>
-      </a:fontRef>
-    </dgm:style>
-  </dgm:styleLbl>
-  <dgm:styleLbl name="asst3">
-    <dgm:scene3d>
-      <a:camera prst="orthographicFront"/>
-      <a:lightRig rig="threePt" dir="t"/>
-    </dgm:scene3d>
-    <dgm:sp3d/>
-    <dgm:txPr/>
-    <dgm:style>
-      <a:lnRef idx="2">
-        <a:scrgbClr r="0" g="0" b="0"/>
-      </a:lnRef>
-      <a:fillRef idx="1">
-        <a:scrgbClr r="0" g="0" b="0"/>
-      </a:fillRef>
-      <a:effectRef idx="0">
-        <a:scrgbClr r="0" g="0" b="0"/>
-      </a:effectRef>
-      <a:fontRef idx="minor">
-        <a:schemeClr val="lt1"/>
-      </a:fontRef>
-    </dgm:style>
-  </dgm:styleLbl>
-  <dgm:styleLbl name="asst4">
-    <dgm:scene3d>
-      <a:camera prst="orthographicFront"/>
-      <a:lightRig rig="threePt" dir="t"/>
-    </dgm:scene3d>
-    <dgm:sp3d/>
-    <dgm:txPr/>
-    <dgm:style>
-      <a:lnRef idx="2">
-        <a:scrgbClr r="0" g="0" b="0"/>
-      </a:lnRef>
-      <a:fillRef idx="1">
-        <a:scrgbClr r="0" g="0" b="0"/>
-      </a:fillRef>
-      <a:effectRef idx="0">
-        <a:scrgbClr r="0" g="0" b="0"/>
-      </a:effectRef>
-      <a:fontRef idx="minor">
-        <a:schemeClr val="lt1"/>
-      </a:fontRef>
-    </dgm:style>
-  </dgm:styleLbl>
-  <dgm:styleLbl name="parChTrans2D1">
-    <dgm:scene3d>
-      <a:camera prst="orthographicFront"/>
-      <a:lightRig rig="threePt" dir="t"/>
-    </dgm:scene3d>
-    <dgm:sp3d/>
-    <dgm:txPr/>
-    <dgm:style>
-      <a:lnRef idx="2">
-        <a:scrgbClr r="0" g="0" b="0"/>
-      </a:lnRef>
-      <a:fillRef idx="1">
-        <a:scrgbClr r="0" g="0" b="0"/>
-      </a:fillRef>
-      <a:effectRef idx="0">
-        <a:scrgbClr r="0" g="0" b="0"/>
-      </a:effectRef>
-      <a:fontRef idx="minor">
-        <a:schemeClr val="lt1"/>
-      </a:fontRef>
-    </dgm:style>
-  </dgm:styleLbl>
-  <dgm:styleLbl name="parChTrans2D2">
-    <dgm:scene3d>
-      <a:camera prst="orthographicFront"/>
-      <a:lightRig rig="threePt" dir="t"/>
-    </dgm:scene3d>
-    <dgm:sp3d/>
-    <dgm:txPr/>
-    <dgm:style>
-      <a:lnRef idx="2">
-        <a:scrgbClr r="0" g="0" b="0"/>
-      </a:lnRef>
-      <a:fillRef idx="1">
-        <a:scrgbClr r="0" g="0" b="0"/>
-      </a:fillRef>
-      <a:effectRef idx="0">
-        <a:scrgbClr r="0" g="0" b="0"/>
-      </a:effectRef>
-      <a:fontRef idx="minor">
-        <a:schemeClr val="lt1"/>
-      </a:fontRef>
-    </dgm:style>
-  </dgm:styleLbl>
-  <dgm:styleLbl name="parChTrans2D3">
-    <dgm:scene3d>
-      <a:camera prst="orthographicFront"/>
-      <a:lightRig rig="threePt" dir="t"/>
-    </dgm:scene3d>
-    <dgm:sp3d/>
-    <dgm:txPr/>
-    <dgm:style>
-      <a:lnRef idx="2">
-        <a:scrgbClr r="0" g="0" b="0"/>
-      </a:lnRef>
-      <a:fillRef idx="1">
-        <a:scrgbClr r="0" g="0" b="0"/>
-      </a:fillRef>
-      <a:effectRef idx="0">
-        <a:scrgbClr r="0" g="0" b="0"/>
-      </a:effectRef>
-      <a:fontRef idx="minor">
-        <a:schemeClr val="lt1"/>
-      </a:fontRef>
-    </dgm:style>
-  </dgm:styleLbl>
-  <dgm:styleLbl name="parChTrans2D4">
-    <dgm:scene3d>
-      <a:camera prst="orthographicFront"/>
-      <a:lightRig rig="threePt" dir="t"/>
-    </dgm:scene3d>
-    <dgm:sp3d/>
-    <dgm:txPr/>
-    <dgm:style>
-      <a:lnRef idx="2">
-        <a:scrgbClr r="0" g="0" b="0"/>
-      </a:lnRef>
-      <a:fillRef idx="1">
-        <a:scrgbClr r="0" g="0" b="0"/>
-      </a:fillRef>
-      <a:effectRef idx="0">
-        <a:scrgbClr r="0" g="0" b="0"/>
-      </a:effectRef>
-      <a:fontRef idx="minor">
-        <a:schemeClr val="lt1"/>
-      </a:fontRef>
-    </dgm:style>
-  </dgm:styleLbl>
-  <dgm:styleLbl name="parChTrans1D1">
-    <dgm:scene3d>
-      <a:camera prst="orthographicFront"/>
-      <a:lightRig rig="threePt" dir="t"/>
-    </dgm:scene3d>
-    <dgm:sp3d/>
-    <dgm:txPr/>
-    <dgm:style>
-      <a:lnRef idx="2">
-        <a:scrgbClr r="0" g="0" b="0"/>
-      </a:lnRef>
-      <a:fillRef idx="0">
-        <a:scrgbClr r="0" g="0" b="0"/>
-      </a:fillRef>
-      <a:effectRef idx="0">
-        <a:scrgbClr r="0" g="0" b="0"/>
-      </a:effectRef>
-      <a:fontRef idx="minor"/>
-    </dgm:style>
-  </dgm:styleLbl>
-  <dgm:styleLbl name="parChTrans1D2">
-    <dgm:scene3d>
-      <a:camera prst="orthographicFront"/>
-      <a:lightRig rig="threePt" dir="t"/>
-    </dgm:scene3d>
-    <dgm:sp3d/>
-    <dgm:txPr/>
-    <dgm:style>
-      <a:lnRef idx="2">
-        <a:scrgbClr r="0" g="0" b="0"/>
-      </a:lnRef>
-      <a:fillRef idx="0">
-        <a:scrgbClr r="0" g="0" b="0"/>
-      </a:fillRef>
-      <a:effectRef idx="0">
-        <a:scrgbClr r="0" g="0" b="0"/>
-      </a:effectRef>
-      <a:fontRef idx="minor"/>
-    </dgm:style>
-  </dgm:styleLbl>
-  <dgm:styleLbl name="parChTrans1D3">
-    <dgm:scene3d>
-      <a:camera prst="orthographicFront"/>
-      <a:lightRig rig="threePt" dir="t"/>
-    </dgm:scene3d>
-    <dgm:sp3d/>
-    <dgm:txPr/>
-    <dgm:style>
-      <a:lnRef idx="2">
-        <a:scrgbClr r="0" g="0" b="0"/>
-      </a:lnRef>
-      <a:fillRef idx="0">
-        <a:scrgbClr r="0" g="0" b="0"/>
-      </a:fillRef>
-      <a:effectRef idx="0">
-        <a:scrgbClr r="0" g="0" b="0"/>
-      </a:effectRef>
-      <a:fontRef idx="minor"/>
-    </dgm:style>
-  </dgm:styleLbl>
-  <dgm:styleLbl name="parChTrans1D4">
-    <dgm:scene3d>
-      <a:camera prst="orthographicFront"/>
-      <a:lightRig rig="threePt" dir="t"/>
-    </dgm:scene3d>
-    <dgm:sp3d/>
-    <dgm:txPr/>
-    <dgm:style>
-      <a:lnRef idx="2">
-        <a:scrgbClr r="0" g="0" b="0"/>
-      </a:lnRef>
-      <a:fillRef idx="0">
-        <a:scrgbClr r="0" g="0" b="0"/>
-      </a:fillRef>
-      <a:effectRef idx="0">
-        <a:scrgbClr r="0" g="0" b="0"/>
-      </a:effectRef>
-      <a:fontRef idx="minor"/>
-    </dgm:style>
-  </dgm:styleLbl>
-  <dgm:styleLbl name="fgAcc1">
-    <dgm:scene3d>
-      <a:camera prst="orthographicFront"/>
-      <a:lightRig rig="threePt" dir="t"/>
-    </dgm:scene3d>
-    <dgm:sp3d/>
-    <dgm:txPr/>
-    <dgm:style>
-      <a:lnRef idx="2">
-        <a:scrgbClr r="0" g="0" b="0"/>
-      </a:lnRef>
-      <a:fillRef idx="1">
-        <a:scrgbClr r="0" g="0" b="0"/>
-      </a:fillRef>
-      <a:effectRef idx="0">
-        <a:scrgbClr r="0" g="0" b="0"/>
-      </a:effectRef>
-      <a:fontRef idx="minor"/>
-    </dgm:style>
-  </dgm:styleLbl>
-  <dgm:styleLbl name="conFgAcc1">
-    <dgm:scene3d>
-      <a:camera prst="orthographicFront"/>
-      <a:lightRig rig="threePt" dir="t"/>
-    </dgm:scene3d>
-    <dgm:sp3d/>
-    <dgm:txPr/>
-    <dgm:style>
-      <a:lnRef idx="2">
-        <a:scrgbClr r="0" g="0" b="0"/>
-      </a:lnRef>
-      <a:fillRef idx="1">
-        <a:scrgbClr r="0" g="0" b="0"/>
-      </a:fillRef>
-      <a:effectRef idx="0">
-        <a:scrgbClr r="0" g="0" b="0"/>
-      </a:effectRef>
-      <a:fontRef idx="minor"/>
-    </dgm:style>
-  </dgm:styleLbl>
-  <dgm:styleLbl name="alignAcc1">
-    <dgm:scene3d>
-      <a:camera prst="orthographicFront"/>
-      <a:lightRig rig="threePt" dir="t"/>
-    </dgm:scene3d>
-    <dgm:sp3d/>
-    <dgm:txPr/>
-    <dgm:style>
-      <a:lnRef idx="2">
-        <a:scrgbClr r="0" g="0" b="0"/>
-      </a:lnRef>
-      <a:fillRef idx="1">
-        <a:scrgbClr r="0" g="0" b="0"/>
-      </a:fillRef>
-      <a:effectRef idx="0">
-        <a:scrgbClr r="0" g="0" b="0"/>
-      </a:effectRef>
-      <a:fontRef idx="minor"/>
-    </dgm:style>
-  </dgm:styleLbl>
-  <dgm:styleLbl name="trAlignAcc1">
-    <dgm:scene3d>
-      <a:camera prst="orthographicFront"/>
-      <a:lightRig rig="threePt" dir="t"/>
-    </dgm:scene3d>
-    <dgm:sp3d/>
-    <dgm:txPr/>
-    <dgm:style>
-      <a:lnRef idx="1">
-        <a:scrgbClr r="0" g="0" b="0"/>
-      </a:lnRef>
-      <a:fillRef idx="1">
-        <a:scrgbClr r="0" g="0" b="0"/>
-      </a:fillRef>
-      <a:effectRef idx="0">
-        <a:scrgbClr r="0" g="0" b="0"/>
-      </a:effectRef>
-      <a:fontRef idx="minor"/>
-    </dgm:style>
-  </dgm:styleLbl>
-  <dgm:styleLbl name="bgAcc1">
-    <dgm:scene3d>
-      <a:camera prst="orthographicFront"/>
-      <a:lightRig rig="threePt" dir="t"/>
-    </dgm:scene3d>
-    <dgm:sp3d/>
-    <dgm:txPr/>
-    <dgm:style>
-      <a:lnRef idx="2">
-        <a:scrgbClr r="0" g="0" b="0"/>
-      </a:lnRef>
-      <a:fillRef idx="1">
-        <a:scrgbClr r="0" g="0" b="0"/>
-      </a:fillRef>
-      <a:effectRef idx="0">
-        <a:scrgbClr r="0" g="0" b="0"/>
-      </a:effectRef>
-      <a:fontRef idx="minor"/>
-    </dgm:style>
-  </dgm:styleLbl>
-  <dgm:styleLbl name="solidFgAcc1">
-    <dgm:scene3d>
-      <a:camera prst="orthographicFront"/>
-      <a:lightRig rig="threePt" dir="t"/>
-    </dgm:scene3d>
-    <dgm:sp3d/>
-    <dgm:txPr/>
-    <dgm:style>
-      <a:lnRef idx="2">
-        <a:scrgbClr r="0" g="0" b="0"/>
-      </a:lnRef>
-      <a:fillRef idx="1">
-        <a:scrgbClr r="0" g="0" b="0"/>
-      </a:fillRef>
-      <a:effectRef idx="0">
-        <a:scrgbClr r="0" g="0" b="0"/>
-      </a:effectRef>
-      <a:fontRef idx="minor"/>
-    </dgm:style>
-  </dgm:styleLbl>
-  <dgm:styleLbl name="solidAlignAcc1">
-    <dgm:scene3d>
-      <a:camera prst="orthographicFront"/>
-      <a:lightRig rig="threePt" dir="t"/>
-    </dgm:scene3d>
-    <dgm:sp3d/>
-    <dgm:txPr/>
-    <dgm:style>
-      <a:lnRef idx="2">
-        <a:scrgbClr r="0" g="0" b="0"/>
-      </a:lnRef>
-      <a:fillRef idx="1">
-        <a:scrgbClr r="0" g="0" b="0"/>
-      </a:fillRef>
-      <a:effectRef idx="0">
-        <a:scrgbClr r="0" g="0" b="0"/>
-      </a:effectRef>
-      <a:fontRef idx="minor"/>
-    </dgm:style>
-  </dgm:styleLbl>
-  <dgm:styleLbl name="solidBgAcc1">
-    <dgm:scene3d>
-      <a:camera prst="orthographicFront"/>
-      <a:lightRig rig="threePt" dir="t"/>
-    </dgm:scene3d>
-    <dgm:sp3d/>
-    <dgm:txPr/>
-    <dgm:style>
-      <a:lnRef idx="2">
-        <a:scrgbClr r="0" g="0" b="0"/>
-      </a:lnRef>
-      <a:fillRef idx="1">
-        <a:scrgbClr r="0" g="0" b="0"/>
-      </a:fillRef>
-      <a:effectRef idx="0">
-        <a:scrgbClr r="0" g="0" b="0"/>
-      </a:effectRef>
-      <a:fontRef idx="minor"/>
-    </dgm:style>
-  </dgm:styleLbl>
-  <dgm:styleLbl name="fgAccFollowNode1">
-    <dgm:scene3d>
-      <a:camera prst="orthographicFront"/>
-      <a:lightRig rig="threePt" dir="t"/>
-    </dgm:scene3d>
-    <dgm:sp3d/>
-    <dgm:txPr/>
-    <dgm:style>
-      <a:lnRef idx="2">
-        <a:scrgbClr r="0" g="0" b="0"/>
-      </a:lnRef>
-      <a:fillRef idx="1">
-        <a:scrgbClr r="0" g="0" b="0"/>
-      </a:fillRef>
-      <a:effectRef idx="0">
-        <a:scrgbClr r="0" g="0" b="0"/>
-      </a:effectRef>
-      <a:fontRef idx="minor"/>
-    </dgm:style>
-  </dgm:styleLbl>
-  <dgm:styleLbl name="alignAccFollowNode1">
-    <dgm:scene3d>
-      <a:camera prst="orthographicFront"/>
-      <a:lightRig rig="threePt" dir="t"/>
-    </dgm:scene3d>
-    <dgm:sp3d/>
-    <dgm:txPr/>
-    <dgm:style>
-      <a:lnRef idx="2">
-        <a:scrgbClr r="0" g="0" b="0"/>
-      </a:lnRef>
-      <a:fillRef idx="1">
-        <a:scrgbClr r="0" g="0" b="0"/>
-      </a:fillRef>
-      <a:effectRef idx="0">
-        <a:scrgbClr r="0" g="0" b="0"/>
-      </a:effectRef>
-      <a:fontRef idx="minor"/>
-    </dgm:style>
-  </dgm:styleLbl>
-  <dgm:styleLbl name="bgAccFollowNode1">
-    <dgm:scene3d>
-      <a:camera prst="orthographicFront"/>
-      <a:lightRig rig="threePt" dir="t"/>
-    </dgm:scene3d>
-    <dgm:sp3d/>
-    <dgm:txPr/>
-    <dgm:style>
-      <a:lnRef idx="2">
-        <a:scrgbClr r="0" g="0" b="0"/>
-      </a:lnRef>
-      <a:fillRef idx="1">
-        <a:scrgbClr r="0" g="0" b="0"/>
-      </a:fillRef>
-      <a:effectRef idx="0">
-        <a:scrgbClr r="0" g="0" b="0"/>
-      </a:effectRef>
-      <a:fontRef idx="minor"/>
-    </dgm:style>
-  </dgm:styleLbl>
-  <dgm:styleLbl name="fgAcc0">
-    <dgm:scene3d>
-      <a:camera prst="orthographicFront"/>
-      <a:lightRig rig="threePt" dir="t"/>
-    </dgm:scene3d>
-    <dgm:sp3d/>
-    <dgm:txPr/>
-    <dgm:style>
-      <a:lnRef idx="2">
-        <a:scrgbClr r="0" g="0" b="0"/>
-      </a:lnRef>
-      <a:fillRef idx="1">
-        <a:scrgbClr r="0" g="0" b="0"/>
-      </a:fillRef>
-      <a:effectRef idx="0">
-        <a:scrgbClr r="0" g="0" b="0"/>
-      </a:effectRef>
-      <a:fontRef idx="minor"/>
-    </dgm:style>
-  </dgm:styleLbl>
-  <dgm:styleLbl name="fgAcc2">
-    <dgm:scene3d>
-      <a:camera prst="orthographicFront"/>
-      <a:lightRig rig="threePt" dir="t"/>
-    </dgm:scene3d>
-    <dgm:sp3d/>
-    <dgm:txPr/>
-    <dgm:style>
-      <a:lnRef idx="2">
-        <a:scrgbClr r="0" g="0" b="0"/>
-      </a:lnRef>
-      <a:fillRef idx="1">
-        <a:scrgbClr r="0" g="0" b="0"/>
-      </a:fillRef>
-      <a:effectRef idx="0">
-        <a:scrgbClr r="0" g="0" b="0"/>
-      </a:effectRef>
-      <a:fontRef idx="minor"/>
-    </dgm:style>
-  </dgm:styleLbl>
-  <dgm:styleLbl name="fgAcc3">
-    <dgm:scene3d>
-      <a:camera prst="orthographicFront"/>
-      <a:lightRig rig="threePt" dir="t"/>
-    </dgm:scene3d>
-    <dgm:sp3d/>
-    <dgm:txPr/>
-    <dgm:style>
-      <a:lnRef idx="2">
-        <a:scrgbClr r="0" g="0" b="0"/>
-      </a:lnRef>
-      <a:fillRef idx="1">
-        <a:scrgbClr r="0" g="0" b="0"/>
-      </a:fillRef>
-      <a:effectRef idx="0">
-        <a:scrgbClr r="0" g="0" b="0"/>
-      </a:effectRef>
-      <a:fontRef idx="minor"/>
-    </dgm:style>
-  </dgm:styleLbl>
-  <dgm:styleLbl name="fgAcc4">
-    <dgm:scene3d>
-      <a:camera prst="orthographicFront"/>
-      <a:lightRig rig="threePt" dir="t"/>
-    </dgm:scene3d>
-    <dgm:sp3d/>
-    <dgm:txPr/>
-    <dgm:style>
-      <a:lnRef idx="2">
-        <a:scrgbClr r="0" g="0" b="0"/>
-      </a:lnRef>
-      <a:fillRef idx="1">
-        <a:scrgbClr r="0" g="0" b="0"/>
-      </a:fillRef>
-      <a:effectRef idx="0">
-        <a:scrgbClr r="0" g="0" b="0"/>
-      </a:effectRef>
-      <a:fontRef idx="minor"/>
-    </dgm:style>
-  </dgm:styleLbl>
-  <dgm:styleLbl name="bgShp">
-    <dgm:scene3d>
-      <a:camera prst="orthographicFront"/>
-      <a:lightRig rig="threePt" dir="t"/>
-    </dgm:scene3d>
-    <dgm:sp3d/>
-    <dgm:txPr/>
-    <dgm:style>
-      <a:lnRef idx="0">
-        <a:scrgbClr r="0" g="0" b="0"/>
-      </a:lnRef>
-      <a:fillRef idx="1">
-        <a:scrgbClr r="0" g="0" b="0"/>
-      </a:fillRef>
-      <a:effectRef idx="0">
-        <a:scrgbClr r="0" g="0" b="0"/>
-      </a:effectRef>
-      <a:fontRef idx="minor"/>
-    </dgm:style>
-  </dgm:styleLbl>
-  <dgm:styleLbl name="dkBgShp">
-    <dgm:scene3d>
-      <a:camera prst="orthographicFront"/>
-      <a:lightRig rig="threePt" dir="t"/>
-    </dgm:scene3d>
-    <dgm:sp3d/>
-    <dgm:txPr/>
-    <dgm:style>
-      <a:lnRef idx="0">
-        <a:scrgbClr r="0" g="0" b="0"/>
-      </a:lnRef>
-      <a:fillRef idx="1">
-        <a:scrgbClr r="0" g="0" b="0"/>
-      </a:fillRef>
-      <a:effectRef idx="0">
-        <a:scrgbClr r="0" g="0" b="0"/>
-      </a:effectRef>
-      <a:fontRef idx="minor"/>
-    </dgm:style>
-  </dgm:styleLbl>
-  <dgm:styleLbl name="trBgShp">
-    <dgm:scene3d>
-      <a:camera prst="orthographicFront"/>
-      <a:lightRig rig="threePt" dir="t"/>
-    </dgm:scene3d>
-    <dgm:sp3d/>
-    <dgm:txPr/>
-    <dgm:style>
-      <a:lnRef idx="0">
-        <a:scrgbClr r="0" g="0" b="0"/>
-      </a:lnRef>
-      <a:fillRef idx="1">
-        <a:scrgbClr r="0" g="0" b="0"/>
-      </a:fillRef>
-      <a:effectRef idx="0">
-        <a:scrgbClr r="0" g="0" b="0"/>
-      </a:effectRef>
-      <a:fontRef idx="minor"/>
-    </dgm:style>
-  </dgm:styleLbl>
-  <dgm:styleLbl name="fgShp">
-    <dgm:scene3d>
-      <a:camera prst="orthographicFront"/>
-      <a:lightRig rig="threePt" dir="t"/>
-    </dgm:scene3d>
-    <dgm:sp3d/>
-    <dgm:txPr/>
-    <dgm:style>
-      <a:lnRef idx="2">
-        <a:scrgbClr r="0" g="0" b="0"/>
-      </a:lnRef>
-      <a:fillRef idx="1">
-        <a:scrgbClr r="0" g="0" b="0"/>
-      </a:fillRef>
-      <a:effectRef idx="0">
-        <a:scrgbClr r="0" g="0" b="0"/>
-      </a:effectRef>
-      <a:fontRef idx="minor"/>
-    </dgm:style>
-  </dgm:styleLbl>
-  <dgm:styleLbl name="revTx">
-    <dgm:scene3d>
-      <a:camera prst="orthographicFront"/>
-      <a:lightRig rig="threePt" dir="t"/>
-    </dgm:scene3d>
-    <dgm:sp3d/>
-    <dgm:txPr/>
-    <dgm:style>
-      <a:lnRef idx="0">
-        <a:scrgbClr r="0" g="0" b="0"/>
-      </a:lnRef>
-      <a:fillRef idx="0">
-        <a:scrgbClr r="0" g="0" b="0"/>
-      </a:fillRef>
-      <a:effectRef idx="0">
-        <a:scrgbClr r="0" g="0" b="0"/>
-      </a:effectRef>
-      <a:fontRef idx="minor"/>
-    </dgm:style>
-  </dgm:styleLbl>
-</dgm:styleDef>
-</file>
-
 <file path=ppt/slideLayouts/slideLayout1.xml><?xml version="1.0" encoding="utf-8"?>
 <p:sldLayout xmlns:a="http://schemas.openxmlformats.org/drawingml/2006/main" xmlns:r="http://schemas.openxmlformats.org/officeDocument/2006/relationships" xmlns:p="http://schemas.openxmlformats.org/presentationml/2006/main" type="title" preserve="1">
   <p:cSld name="Title Slide">
@@ -3932,7 +270,7 @@
           <a:p>
             <a:fld id="{66665395-52C5-5E4B-BB20-CD4E0BBC9899}" type="datetimeFigureOut">
               <a:rPr lang="en-GB" smtClean="0"/>
-              <a:t>03/09/2019</a:t>
+              <a:t>04/09/2019</a:t>
             </a:fld>
             <a:endParaRPr lang="en-GB"/>
           </a:p>
@@ -4132,7 +470,7 @@
           <a:p>
             <a:fld id="{66665395-52C5-5E4B-BB20-CD4E0BBC9899}" type="datetimeFigureOut">
               <a:rPr lang="en-GB" smtClean="0"/>
-              <a:t>03/09/2019</a:t>
+              <a:t>04/09/2019</a:t>
             </a:fld>
             <a:endParaRPr lang="en-GB"/>
           </a:p>
@@ -4342,7 +680,7 @@
           <a:p>
             <a:fld id="{66665395-52C5-5E4B-BB20-CD4E0BBC9899}" type="datetimeFigureOut">
               <a:rPr lang="en-GB" smtClean="0"/>
-              <a:t>03/09/2019</a:t>
+              <a:t>04/09/2019</a:t>
             </a:fld>
             <a:endParaRPr lang="en-GB"/>
           </a:p>
@@ -4542,7 +880,7 @@
           <a:p>
             <a:fld id="{66665395-52C5-5E4B-BB20-CD4E0BBC9899}" type="datetimeFigureOut">
               <a:rPr lang="en-GB" smtClean="0"/>
-              <a:t>03/09/2019</a:t>
+              <a:t>04/09/2019</a:t>
             </a:fld>
             <a:endParaRPr lang="en-GB"/>
           </a:p>
@@ -4818,7 +1156,7 @@
           <a:p>
             <a:fld id="{66665395-52C5-5E4B-BB20-CD4E0BBC9899}" type="datetimeFigureOut">
               <a:rPr lang="en-GB" smtClean="0"/>
-              <a:t>03/09/2019</a:t>
+              <a:t>04/09/2019</a:t>
             </a:fld>
             <a:endParaRPr lang="en-GB"/>
           </a:p>
@@ -5086,7 +1424,7 @@
           <a:p>
             <a:fld id="{66665395-52C5-5E4B-BB20-CD4E0BBC9899}" type="datetimeFigureOut">
               <a:rPr lang="en-GB" smtClean="0"/>
-              <a:t>03/09/2019</a:t>
+              <a:t>04/09/2019</a:t>
             </a:fld>
             <a:endParaRPr lang="en-GB"/>
           </a:p>
@@ -5501,7 +1839,7 @@
           <a:p>
             <a:fld id="{66665395-52C5-5E4B-BB20-CD4E0BBC9899}" type="datetimeFigureOut">
               <a:rPr lang="en-GB" smtClean="0"/>
-              <a:t>03/09/2019</a:t>
+              <a:t>04/09/2019</a:t>
             </a:fld>
             <a:endParaRPr lang="en-GB"/>
           </a:p>
@@ -5643,7 +1981,7 @@
           <a:p>
             <a:fld id="{66665395-52C5-5E4B-BB20-CD4E0BBC9899}" type="datetimeFigureOut">
               <a:rPr lang="en-GB" smtClean="0"/>
-              <a:t>03/09/2019</a:t>
+              <a:t>04/09/2019</a:t>
             </a:fld>
             <a:endParaRPr lang="en-GB"/>
           </a:p>
@@ -5756,7 +2094,7 @@
           <a:p>
             <a:fld id="{66665395-52C5-5E4B-BB20-CD4E0BBC9899}" type="datetimeFigureOut">
               <a:rPr lang="en-GB" smtClean="0"/>
-              <a:t>03/09/2019</a:t>
+              <a:t>04/09/2019</a:t>
             </a:fld>
             <a:endParaRPr lang="en-GB"/>
           </a:p>
@@ -6069,7 +2407,7 @@
           <a:p>
             <a:fld id="{66665395-52C5-5E4B-BB20-CD4E0BBC9899}" type="datetimeFigureOut">
               <a:rPr lang="en-GB" smtClean="0"/>
-              <a:t>03/09/2019</a:t>
+              <a:t>04/09/2019</a:t>
             </a:fld>
             <a:endParaRPr lang="en-GB"/>
           </a:p>
@@ -6358,7 +2696,7 @@
           <a:p>
             <a:fld id="{66665395-52C5-5E4B-BB20-CD4E0BBC9899}" type="datetimeFigureOut">
               <a:rPr lang="en-GB" smtClean="0"/>
-              <a:t>03/09/2019</a:t>
+              <a:t>04/09/2019</a:t>
             </a:fld>
             <a:endParaRPr lang="en-GB"/>
           </a:p>
@@ -6601,7 +2939,7 @@
           <a:p>
             <a:fld id="{66665395-52C5-5E4B-BB20-CD4E0BBC9899}" type="datetimeFigureOut">
               <a:rPr lang="en-GB" smtClean="0"/>
-              <a:t>03/09/2019</a:t>
+              <a:t>04/09/2019</a:t>
             </a:fld>
             <a:endParaRPr lang="en-GB"/>
           </a:p>
@@ -7341,316 +3679,6 @@
 </p:sld>
 </file>
 
-<file path=ppt/slides/slide11.xml><?xml version="1.0" encoding="utf-8"?>
-<p:sld xmlns:a="http://schemas.openxmlformats.org/drawingml/2006/main" xmlns:r="http://schemas.openxmlformats.org/officeDocument/2006/relationships" xmlns:p="http://schemas.openxmlformats.org/presentationml/2006/main">
-  <p:cSld>
-    <p:spTree>
-      <p:nvGrpSpPr>
-        <p:cNvPr id="1" name=""/>
-        <p:cNvGrpSpPr/>
-        <p:nvPr/>
-      </p:nvGrpSpPr>
-      <p:grpSpPr>
-        <a:xfrm>
-          <a:off x="0" y="0"/>
-          <a:ext cx="0" cy="0"/>
-          <a:chOff x="0" y="0"/>
-          <a:chExt cx="0" cy="0"/>
-        </a:xfrm>
-      </p:grpSpPr>
-      <p:pic>
-        <p:nvPicPr>
-          <p:cNvPr id="7" name="Picture 6">
-            <a:extLst>
-              <a:ext uri="{FF2B5EF4-FFF2-40B4-BE49-F238E27FC236}">
-                <a16:creationId xmlns:a16="http://schemas.microsoft.com/office/drawing/2014/main" id="{E3187A82-0531-DA43-A1C7-3AF278CCA87D}"/>
-              </a:ext>
-            </a:extLst>
-          </p:cNvPr>
-          <p:cNvPicPr>
-            <a:picLocks noChangeAspect="1"/>
-          </p:cNvPicPr>
-          <p:nvPr/>
-        </p:nvPicPr>
-        <p:blipFill>
-          <a:blip r:embed="rId2"/>
-          <a:stretch>
-            <a:fillRect/>
-          </a:stretch>
-        </p:blipFill>
-        <p:spPr>
-          <a:xfrm>
-            <a:off x="-167828" y="1743591"/>
-            <a:ext cx="7340600" cy="4152900"/>
-          </a:xfrm>
-          <a:prstGeom prst="rect">
-            <a:avLst/>
-          </a:prstGeom>
-        </p:spPr>
-      </p:pic>
-      <p:graphicFrame>
-        <p:nvGraphicFramePr>
-          <p:cNvPr id="8" name="Diagram 7">
-            <a:extLst>
-              <a:ext uri="{FF2B5EF4-FFF2-40B4-BE49-F238E27FC236}">
-                <a16:creationId xmlns:a16="http://schemas.microsoft.com/office/drawing/2014/main" id="{804A32D8-CAB7-0D47-8DDF-E1184D79E434}"/>
-              </a:ext>
-            </a:extLst>
-          </p:cNvPr>
-          <p:cNvGraphicFramePr/>
-          <p:nvPr>
-            <p:extLst>
-              <p:ext uri="{D42A27DB-BD31-4B8C-83A1-F6EECF244321}">
-                <p14:modId xmlns:p14="http://schemas.microsoft.com/office/powerpoint/2010/main" val="1606740762"/>
-              </p:ext>
-            </p:extLst>
-          </p:nvPr>
-        </p:nvGraphicFramePr>
-        <p:xfrm>
-          <a:off x="6960936" y="1743591"/>
-          <a:ext cx="5430253" cy="3994887"/>
-        </p:xfrm>
-        <a:graphic>
-          <a:graphicData uri="http://schemas.openxmlformats.org/drawingml/2006/diagram">
-            <dgm:relIds xmlns:dgm="http://schemas.openxmlformats.org/drawingml/2006/diagram" xmlns:r="http://schemas.openxmlformats.org/officeDocument/2006/relationships" r:dm="rId3" r:lo="rId4" r:qs="rId5" r:cs="rId6"/>
-          </a:graphicData>
-        </a:graphic>
-      </p:graphicFrame>
-      <p:sp>
-        <p:nvSpPr>
-          <p:cNvPr id="9" name="Title 1">
-            <a:extLst>
-              <a:ext uri="{FF2B5EF4-FFF2-40B4-BE49-F238E27FC236}">
-                <a16:creationId xmlns:a16="http://schemas.microsoft.com/office/drawing/2014/main" id="{2B597078-62C4-224C-8249-062C1B1E2FF1}"/>
-              </a:ext>
-            </a:extLst>
-          </p:cNvPr>
-          <p:cNvSpPr txBox="1">
-            <a:spLocks/>
-          </p:cNvSpPr>
-          <p:nvPr/>
-        </p:nvSpPr>
-        <p:spPr>
-          <a:xfrm>
-            <a:off x="364958" y="199064"/>
-            <a:ext cx="10515600" cy="1325563"/>
-          </a:xfrm>
-          <a:prstGeom prst="rect">
-            <a:avLst/>
-          </a:prstGeom>
-        </p:spPr>
-        <p:txBody>
-          <a:bodyPr vert="horz" lIns="91440" tIns="45720" rIns="91440" bIns="45720" rtlCol="0" anchor="ctr">
-            <a:normAutofit/>
-          </a:bodyPr>
-          <a:lstStyle>
-            <a:lvl1pPr algn="l" defTabSz="914400" rtl="0" eaLnBrk="1" latinLnBrk="0" hangingPunct="1">
-              <a:lnSpc>
-                <a:spcPct val="90000"/>
-              </a:lnSpc>
-              <a:spcBef>
-                <a:spcPct val="0"/>
-              </a:spcBef>
-              <a:buNone/>
-              <a:defRPr sz="4400" kern="1200">
-                <a:solidFill>
-                  <a:schemeClr val="tx1"/>
-                </a:solidFill>
-                <a:latin typeface="+mj-lt"/>
-                <a:ea typeface="+mj-ea"/>
-                <a:cs typeface="+mj-cs"/>
-              </a:defRPr>
-            </a:lvl1pPr>
-          </a:lstStyle>
-          <a:p>
-            <a:r>
-              <a:rPr lang="en-GB" dirty="0" err="1"/>
-              <a:t>Kommandolinjen</a:t>
-            </a:r>
-            <a:r>
-              <a:rPr lang="en-GB" dirty="0"/>
-              <a:t> (</a:t>
-            </a:r>
-            <a:r>
-              <a:rPr lang="en-GB" dirty="0" err="1"/>
-              <a:t>terminalen</a:t>
-            </a:r>
-            <a:r>
-              <a:rPr lang="en-GB" dirty="0"/>
-              <a:t>)</a:t>
-            </a:r>
-          </a:p>
-        </p:txBody>
-      </p:sp>
-    </p:spTree>
-    <p:extLst>
-      <p:ext uri="{BB962C8B-B14F-4D97-AF65-F5344CB8AC3E}">
-        <p14:creationId xmlns:p14="http://schemas.microsoft.com/office/powerpoint/2010/main" val="3637179099"/>
-      </p:ext>
-    </p:extLst>
-  </p:cSld>
-  <p:clrMapOvr>
-    <a:masterClrMapping/>
-  </p:clrMapOvr>
-</p:sld>
-</file>
-
-<file path=ppt/slides/slide12.xml><?xml version="1.0" encoding="utf-8"?>
-<p:sld xmlns:a="http://schemas.openxmlformats.org/drawingml/2006/main" xmlns:r="http://schemas.openxmlformats.org/officeDocument/2006/relationships" xmlns:p="http://schemas.openxmlformats.org/presentationml/2006/main">
-  <p:cSld>
-    <p:spTree>
-      <p:nvGrpSpPr>
-        <p:cNvPr id="1" name=""/>
-        <p:cNvGrpSpPr/>
-        <p:nvPr/>
-      </p:nvGrpSpPr>
-      <p:grpSpPr>
-        <a:xfrm>
-          <a:off x="0" y="0"/>
-          <a:ext cx="0" cy="0"/>
-          <a:chOff x="0" y="0"/>
-          <a:chExt cx="0" cy="0"/>
-        </a:xfrm>
-      </p:grpSpPr>
-      <p:sp>
-        <p:nvSpPr>
-          <p:cNvPr id="9" name="Title 1">
-            <a:extLst>
-              <a:ext uri="{FF2B5EF4-FFF2-40B4-BE49-F238E27FC236}">
-                <a16:creationId xmlns:a16="http://schemas.microsoft.com/office/drawing/2014/main" id="{2B597078-62C4-224C-8249-062C1B1E2FF1}"/>
-              </a:ext>
-            </a:extLst>
-          </p:cNvPr>
-          <p:cNvSpPr txBox="1">
-            <a:spLocks/>
-          </p:cNvSpPr>
-          <p:nvPr/>
-        </p:nvSpPr>
-        <p:spPr>
-          <a:xfrm>
-            <a:off x="364958" y="199064"/>
-            <a:ext cx="10515600" cy="1325563"/>
-          </a:xfrm>
-          <a:prstGeom prst="rect">
-            <a:avLst/>
-          </a:prstGeom>
-        </p:spPr>
-        <p:txBody>
-          <a:bodyPr vert="horz" lIns="91440" tIns="45720" rIns="91440" bIns="45720" rtlCol="0" anchor="ctr">
-            <a:normAutofit/>
-          </a:bodyPr>
-          <a:lstStyle>
-            <a:lvl1pPr algn="l" defTabSz="914400" rtl="0" eaLnBrk="1" latinLnBrk="0" hangingPunct="1">
-              <a:lnSpc>
-                <a:spcPct val="90000"/>
-              </a:lnSpc>
-              <a:spcBef>
-                <a:spcPct val="0"/>
-              </a:spcBef>
-              <a:buNone/>
-              <a:defRPr sz="4400" kern="1200">
-                <a:solidFill>
-                  <a:schemeClr val="tx1"/>
-                </a:solidFill>
-                <a:latin typeface="+mj-lt"/>
-                <a:ea typeface="+mj-ea"/>
-                <a:cs typeface="+mj-cs"/>
-              </a:defRPr>
-            </a:lvl1pPr>
-          </a:lstStyle>
-          <a:p>
-            <a:r>
-              <a:rPr lang="en-GB" dirty="0" err="1"/>
-              <a:t>Tekst</a:t>
-            </a:r>
-            <a:r>
-              <a:rPr lang="en-GB" dirty="0"/>
-              <a:t> editor </a:t>
-            </a:r>
-            <a:r>
-              <a:rPr lang="en-GB" dirty="0" err="1"/>
-              <a:t>og</a:t>
-            </a:r>
-            <a:r>
-              <a:rPr lang="en-GB" dirty="0"/>
-              <a:t> LaTeX</a:t>
-            </a:r>
-          </a:p>
-        </p:txBody>
-      </p:sp>
-      <p:pic>
-        <p:nvPicPr>
-          <p:cNvPr id="4" name="Picture 3">
-            <a:extLst>
-              <a:ext uri="{FF2B5EF4-FFF2-40B4-BE49-F238E27FC236}">
-                <a16:creationId xmlns:a16="http://schemas.microsoft.com/office/drawing/2014/main" id="{081D6A9B-77B0-474C-8EBF-7E14F77EA5A4}"/>
-              </a:ext>
-            </a:extLst>
-          </p:cNvPr>
-          <p:cNvPicPr>
-            <a:picLocks noChangeAspect="1"/>
-          </p:cNvPicPr>
-          <p:nvPr/>
-        </p:nvPicPr>
-        <p:blipFill>
-          <a:blip r:embed="rId2"/>
-          <a:stretch>
-            <a:fillRect/>
-          </a:stretch>
-        </p:blipFill>
-        <p:spPr>
-          <a:xfrm>
-            <a:off x="3252538" y="2018966"/>
-            <a:ext cx="4152900" cy="1701800"/>
-          </a:xfrm>
-          <a:prstGeom prst="rect">
-            <a:avLst/>
-          </a:prstGeom>
-        </p:spPr>
-      </p:pic>
-      <p:pic>
-        <p:nvPicPr>
-          <p:cNvPr id="10" name="Picture 9">
-            <a:extLst>
-              <a:ext uri="{FF2B5EF4-FFF2-40B4-BE49-F238E27FC236}">
-                <a16:creationId xmlns:a16="http://schemas.microsoft.com/office/drawing/2014/main" id="{C2511760-4ED8-5745-8FF7-BBF5B8405F2E}"/>
-              </a:ext>
-            </a:extLst>
-          </p:cNvPr>
-          <p:cNvPicPr>
-            <a:picLocks noChangeAspect="1"/>
-          </p:cNvPicPr>
-          <p:nvPr/>
-        </p:nvPicPr>
-        <p:blipFill>
-          <a:blip r:embed="rId3"/>
-          <a:stretch>
-            <a:fillRect/>
-          </a:stretch>
-        </p:blipFill>
-        <p:spPr>
-          <a:xfrm>
-            <a:off x="2498558" y="4502150"/>
-            <a:ext cx="6248400" cy="1511300"/>
-          </a:xfrm>
-          <a:prstGeom prst="rect">
-            <a:avLst/>
-          </a:prstGeom>
-        </p:spPr>
-      </p:pic>
-    </p:spTree>
-    <p:extLst>
-      <p:ext uri="{BB962C8B-B14F-4D97-AF65-F5344CB8AC3E}">
-        <p14:creationId xmlns:p14="http://schemas.microsoft.com/office/powerpoint/2010/main" val="3637323886"/>
-      </p:ext>
-    </p:extLst>
-  </p:cSld>
-  <p:clrMapOvr>
-    <a:masterClrMapping/>
-  </p:clrMapOvr>
-</p:sld>
-</file>
-
 <file path=ppt/slides/slide2.xml><?xml version="1.0" encoding="utf-8"?>
 <p:sld xmlns:a="http://schemas.openxmlformats.org/drawingml/2006/main" xmlns:r="http://schemas.openxmlformats.org/officeDocument/2006/relationships" xmlns:p="http://schemas.openxmlformats.org/presentationml/2006/main">
   <p:cSld>

</xml_diff>